<commit_message>
WW - last edits
</commit_message>
<xml_diff>
--- a/Final_Slides.pptx
+++ b/Final_Slides.pptx
@@ -6,26 +6,24 @@
     <p:sldMasterId id="2147483648" r:id="rId2"/>
   </p:sldMasterIdLst>
   <p:notesMasterIdLst>
-    <p:notesMasterId r:id="rId15"/>
+    <p:notesMasterId r:id="rId13"/>
   </p:notesMasterIdLst>
   <p:sldIdLst>
     <p:sldId id="256" r:id="rId3"/>
-    <p:sldId id="260" r:id="rId4"/>
-    <p:sldId id="293" r:id="rId5"/>
-    <p:sldId id="294" r:id="rId6"/>
-    <p:sldId id="295" r:id="rId7"/>
-    <p:sldId id="291" r:id="rId8"/>
-    <p:sldId id="292" r:id="rId9"/>
-    <p:sldId id="258" r:id="rId10"/>
-    <p:sldId id="296" r:id="rId11"/>
-    <p:sldId id="300" r:id="rId12"/>
-    <p:sldId id="299" r:id="rId13"/>
-    <p:sldId id="298" r:id="rId14"/>
+    <p:sldId id="294" r:id="rId4"/>
+    <p:sldId id="295" r:id="rId5"/>
+    <p:sldId id="291" r:id="rId6"/>
+    <p:sldId id="292" r:id="rId7"/>
+    <p:sldId id="258" r:id="rId8"/>
+    <p:sldId id="296" r:id="rId9"/>
+    <p:sldId id="300" r:id="rId10"/>
+    <p:sldId id="299" r:id="rId11"/>
+    <p:sldId id="298" r:id="rId12"/>
   </p:sldIdLst>
   <p:sldSz cx="12192000" cy="6858000"/>
   <p:notesSz cx="6858000" cy="9144000"/>
   <p:custDataLst>
-    <p:tags r:id="rId16"/>
+    <p:tags r:id="rId14"/>
   </p:custDataLst>
   <p:defaultTextStyle>
     <a:defPPr>
@@ -4861,148 +4859,49 @@
             <a:endParaRPr lang="en-US" dirty="0"/>
           </a:p>
           <a:p>
-            <a:pPr marL="0" marR="0" lvl="0" indent="0" algn="l" defTabSz="914400" rtl="0" eaLnBrk="1" fontAlgn="auto" latinLnBrk="0" hangingPunct="1">
-              <a:lnSpc>
-                <a:spcPct val="100000"/>
-              </a:lnSpc>
-              <a:spcBef>
-                <a:spcPts val="0"/>
-              </a:spcBef>
-              <a:spcAft>
-                <a:spcPts val="0"/>
-              </a:spcAft>
-              <a:buClrTx/>
-              <a:buSzTx/>
-              <a:buFontTx/>
-              <a:buNone/>
-              <a:tabLst/>
-              <a:defRPr/>
-            </a:pPr>
             <a:r>
               <a:rPr lang="en-US" dirty="0"/>
-              <a:t>I am now going to showcase a false positive (type 1 error) example.</a:t>
-            </a:r>
-          </a:p>
-          <a:p>
+              <a:t>Looking ahead, our enhancements focus on four key areas. First, we’ll improve </a:t>
+            </a:r>
+            <a:r>
+              <a:rPr lang="en-US" b="1" dirty="0"/>
+              <a:t>Data Input</a:t>
+            </a:r>
+            <a:r>
+              <a:rPr lang="en-US" dirty="0"/>
+              <a:t> by supporting diverse languages, integrating rich metadata, and balancing our dataset. Next, in </a:t>
+            </a:r>
+            <a:r>
+              <a:rPr lang="en-US" b="1" dirty="0"/>
+              <a:t>Pre-Processing</a:t>
+            </a:r>
+            <a:r>
+              <a:rPr lang="en-US" dirty="0"/>
+              <a:t>, we’ll refine feature engineering by incorporating punctuation and grammar analysis, and leveraging semantic and stop words features. For </a:t>
+            </a:r>
+            <a:r>
+              <a:rPr lang="en-US" b="1" dirty="0"/>
+              <a:t>Model Enhancements</a:t>
+            </a:r>
+            <a:r>
+              <a:rPr lang="en-US" dirty="0"/>
+              <a:t>, we aim to develop context-aware models that can scale effectively. Finally, we’ll establish a </a:t>
+            </a:r>
+            <a:r>
+              <a:rPr lang="en-US" b="1" dirty="0"/>
+              <a:t>Continuous Learning</a:t>
+            </a:r>
+            <a:r>
+              <a:rPr lang="en-US" dirty="0"/>
+              <a:t> loop with real-time feedback and maintain ethical transparency throughout. These steps will drive our model toward more sophisticated, common-sense decision-making.</a:t>
+            </a:r>
+            <a:r>
+              <a:rPr lang="en-US" dirty="0">
+                <a:sym typeface="Wingdings" panose="05000000000000000000" pitchFamily="2" charset="2"/>
+              </a:rPr>
+              <a:t> </a:t>
+            </a:r>
             <a:endParaRPr lang="en-US" dirty="0"/>
-          </a:p>
-          <a:p>
-            <a:r>
-              <a:rPr lang="en-US" dirty="0"/>
-              <a:t>Here I have some ‘realistic’ content generated in ChatGPT, which I am going to plug into the model. Before we go to </a:t>
-            </a:r>
-            <a:r>
-              <a:rPr lang="en-US" dirty="0" err="1"/>
-              <a:t>Streamlit</a:t>
-            </a:r>
-            <a:r>
-              <a:rPr lang="en-US" dirty="0"/>
-              <a:t>, what do you think makes this a blatantly false article?</a:t>
-            </a:r>
-            <a:br>
-              <a:rPr lang="en-US" dirty="0"/>
-            </a:br>
-            <a:endParaRPr lang="en-US" dirty="0"/>
-          </a:p>
-          <a:p>
-            <a:r>
-              <a:rPr lang="en-US" b="1" dirty="0"/>
-              <a:t>Some examples:</a:t>
-            </a:r>
-            <a:br>
-              <a:rPr lang="en-US" dirty="0"/>
-            </a:br>
-            <a:r>
-              <a:rPr lang="en-US" b="1" dirty="0"/>
-              <a:t>Unusual Location for a Major Conservation Effort</a:t>
-            </a:r>
-            <a:endParaRPr lang="en-US" dirty="0"/>
-          </a:p>
-          <a:p>
-            <a:r>
-              <a:rPr lang="en-US" b="1" dirty="0"/>
-              <a:t>1. Inconsistent Timing:</a:t>
-            </a:r>
-            <a:endParaRPr lang="en-US" dirty="0"/>
-          </a:p>
-          <a:p>
-            <a:pPr>
-              <a:buFont typeface="Arial" panose="020B0604020202020204" pitchFamily="34" charset="0"/>
-              <a:buNone/>
-            </a:pPr>
-            <a:r>
-              <a:rPr lang="en-US" dirty="0"/>
-              <a:t>Breeding animals in captivity, including rabbits, has been common practice for decades. The claim of this being the first rabbit born in captivity in over a century is highly improbable.</a:t>
-            </a:r>
-          </a:p>
-          <a:p>
-            <a:r>
-              <a:rPr lang="en-US" b="1" dirty="0"/>
-              <a:t>2. Overly Dramatic Language</a:t>
-            </a:r>
-          </a:p>
-          <a:p>
-            <a:r>
-              <a:rPr lang="en-US" b="1" dirty="0"/>
-              <a:t>3. Lack of Specific Details About the Species</a:t>
-            </a:r>
-          </a:p>
-          <a:p>
-            <a:r>
-              <a:rPr lang="en-US" b="1" dirty="0"/>
-              <a:t>4. Absence of Credible Sources or References</a:t>
-            </a:r>
-          </a:p>
-          <a:p>
-            <a:r>
-              <a:rPr lang="en-US" b="1" dirty="0"/>
-              <a:t>5. Exaggerated Timeline and Effort</a:t>
-            </a:r>
-            <a:endParaRPr lang="en-US" dirty="0"/>
-          </a:p>
-          <a:p>
-            <a:pPr>
-              <a:buFont typeface="Arial" panose="020B0604020202020204" pitchFamily="34" charset="0"/>
-              <a:buNone/>
-            </a:pPr>
-            <a:r>
-              <a:rPr lang="en-US" dirty="0"/>
-              <a:t>Rabbits are not typically challenging to breed, so a decade of effort seems exaggerated and unrealistic.</a:t>
-            </a:r>
-          </a:p>
-          <a:p>
-            <a:r>
-              <a:rPr lang="en-US" b="1" dirty="0"/>
-              <a:t>6. Suspicious Details About the Zoo, Personnel and Innovative Techniques</a:t>
-            </a:r>
-            <a:endParaRPr lang="en-US" dirty="0"/>
-          </a:p>
-          <a:p>
-            <a:pPr>
-              <a:buFont typeface="Arial" panose="020B0604020202020204" pitchFamily="34" charset="0"/>
-              <a:buNone/>
-            </a:pPr>
-            <a:r>
-              <a:rPr lang="en-US" dirty="0"/>
-              <a:t>In genuine news stories, significant figures like a Chief Zookeeper involved in a major breakthrough would usually have some background details or credentials provided.</a:t>
-            </a:r>
-          </a:p>
-          <a:p>
-            <a:endParaRPr lang="en-US" dirty="0"/>
-          </a:p>
-          <a:p>
-            <a:r>
-              <a:rPr lang="en-US" dirty="0"/>
-              <a:t>[Go to </a:t>
-            </a:r>
-            <a:r>
-              <a:rPr lang="en-US" dirty="0" err="1"/>
-              <a:t>Streamlit</a:t>
-            </a:r>
-            <a:r>
-              <a:rPr lang="en-US" dirty="0"/>
-              <a:t>]</a:t>
-            </a:r>
           </a:p>
         </p:txBody>
       </p:sp>
@@ -5024,391 +4923,6 @@
             <a:fld id="{C7B266E1-CF86-4AAB-956B-04E1E502B720}" type="slidenum">
               <a:rPr lang="en-US" smtClean="0"/>
               <a:t>10</a:t>
-            </a:fld>
-            <a:endParaRPr lang="en-US"/>
-          </a:p>
-        </p:txBody>
-      </p:sp>
-    </p:spTree>
-    <p:extLst>
-      <p:ext uri="{BB962C8B-B14F-4D97-AF65-F5344CB8AC3E}">
-        <p14:creationId xmlns:p14="http://schemas.microsoft.com/office/powerpoint/2010/main" val="3303561258"/>
-      </p:ext>
-    </p:extLst>
-  </p:cSld>
-  <p:clrMapOvr>
-    <a:masterClrMapping/>
-  </p:clrMapOvr>
-</p:notes>
-</file>
-
-<file path=ppt/notesSlides/notesSlide11.xml><?xml version="1.0" encoding="utf-8"?>
-<p:notes xmlns:a="http://schemas.openxmlformats.org/drawingml/2006/main" xmlns:r="http://schemas.openxmlformats.org/officeDocument/2006/relationships" xmlns:p="http://schemas.openxmlformats.org/presentationml/2006/main">
-  <p:cSld>
-    <p:spTree>
-      <p:nvGrpSpPr>
-        <p:cNvPr id="1" name=""/>
-        <p:cNvGrpSpPr/>
-        <p:nvPr/>
-      </p:nvGrpSpPr>
-      <p:grpSpPr>
-        <a:xfrm>
-          <a:off x="0" y="0"/>
-          <a:ext cx="0" cy="0"/>
-          <a:chOff x="0" y="0"/>
-          <a:chExt cx="0" cy="0"/>
-        </a:xfrm>
-      </p:grpSpPr>
-      <p:sp>
-        <p:nvSpPr>
-          <p:cNvPr id="2" name="Slide Image Placeholder 1"/>
-          <p:cNvSpPr>
-            <a:spLocks noGrp="1" noRot="1" noChangeAspect="1"/>
-          </p:cNvSpPr>
-          <p:nvPr>
-            <p:ph type="sldImg"/>
-          </p:nvPr>
-        </p:nvSpPr>
-        <p:spPr/>
-      </p:sp>
-      <p:sp>
-        <p:nvSpPr>
-          <p:cNvPr id="3" name="Notes Placeholder 2"/>
-          <p:cNvSpPr>
-            <a:spLocks noGrp="1"/>
-          </p:cNvSpPr>
-          <p:nvPr>
-            <p:ph type="body" idx="1"/>
-          </p:nvPr>
-        </p:nvSpPr>
-        <p:spPr/>
-        <p:txBody>
-          <a:bodyPr/>
-          <a:lstStyle/>
-          <a:p>
-            <a:pPr marL="0" marR="0" lvl="0" indent="0" algn="l" defTabSz="914400" rtl="0" eaLnBrk="1" fontAlgn="auto" latinLnBrk="0" hangingPunct="1">
-              <a:lnSpc>
-                <a:spcPct val="100000"/>
-              </a:lnSpc>
-              <a:spcBef>
-                <a:spcPts val="0"/>
-              </a:spcBef>
-              <a:spcAft>
-                <a:spcPts val="0"/>
-              </a:spcAft>
-              <a:buClrTx/>
-              <a:buSzTx/>
-              <a:buFontTx/>
-              <a:buNone/>
-              <a:tabLst/>
-              <a:defRPr/>
-            </a:pPr>
-            <a:r>
-              <a:rPr lang="en-US" b="1" dirty="0"/>
-              <a:t>Presenter: </a:t>
-            </a:r>
-            <a:r>
-              <a:rPr lang="en-US" b="0" dirty="0"/>
-              <a:t>Wendy</a:t>
-            </a:r>
-          </a:p>
-          <a:p>
-            <a:endParaRPr lang="en-US" dirty="0"/>
-          </a:p>
-          <a:p>
-            <a:r>
-              <a:rPr lang="en-US" b="1" dirty="0"/>
-              <a:t>Introduction:</a:t>
-            </a:r>
-            <a:r>
-              <a:rPr lang="en-US" dirty="0"/>
-              <a:t> "Now that we've explored an example of a false positive, let's dive into some detective work. Can you tell me why our fake news predictor might have misclassified this article.“</a:t>
-            </a:r>
-          </a:p>
-          <a:p>
-            <a:endParaRPr lang="en-US" dirty="0"/>
-          </a:p>
-          <a:p>
-            <a:r>
-              <a:rPr lang="en-US" b="1" dirty="0"/>
-              <a:t>Language Considerations:</a:t>
-            </a:r>
-            <a:endParaRPr lang="en-US" dirty="0"/>
-          </a:p>
-          <a:p>
-            <a:pPr>
-              <a:buFont typeface="Arial" panose="020B0604020202020204" pitchFamily="34" charset="0"/>
-              <a:buChar char="•"/>
-            </a:pPr>
-            <a:r>
-              <a:rPr lang="en-US" b="1" dirty="0"/>
-              <a:t> "Language:</a:t>
-            </a:r>
-            <a:r>
-              <a:rPr lang="en-US" dirty="0"/>
-              <a:t> Our model is trained exclusively on English text, which means nuances in other languages aren't accounted for. This can limit the model's ability to generalize across different linguistic contexts."</a:t>
-            </a:r>
-          </a:p>
-          <a:p>
-            <a:r>
-              <a:rPr lang="en-US" b="1" dirty="0"/>
-              <a:t>Punctuation Removal:</a:t>
-            </a:r>
-            <a:endParaRPr lang="en-US" dirty="0"/>
-          </a:p>
-          <a:p>
-            <a:pPr>
-              <a:buFont typeface="Arial" panose="020B0604020202020204" pitchFamily="34" charset="0"/>
-              <a:buChar char="•"/>
-            </a:pPr>
-            <a:r>
-              <a:rPr lang="en-US" b="1" dirty="0"/>
-              <a:t>"Punctuation:</a:t>
-            </a:r>
-            <a:r>
-              <a:rPr lang="en-US" dirty="0"/>
-              <a:t> In our preprocessing, we removed punctuation. However, this might remove important cues. Perhaps punctuation, especially in specific contexts, could serve as an indicator of authenticity or fabrication. Incorporating punctuation as a feature could be worth exploring."</a:t>
-            </a:r>
-          </a:p>
-          <a:p>
-            <a:r>
-              <a:rPr lang="en-US" b="1" dirty="0"/>
-              <a:t>Stop Words:</a:t>
-            </a:r>
-            <a:endParaRPr lang="en-US" dirty="0"/>
-          </a:p>
-          <a:p>
-            <a:pPr>
-              <a:buFont typeface="Arial" panose="020B0604020202020204" pitchFamily="34" charset="0"/>
-              <a:buChar char="•"/>
-            </a:pPr>
-            <a:r>
-              <a:rPr lang="en-US" b="1" dirty="0"/>
-              <a:t>"Stop Words:</a:t>
-            </a:r>
-            <a:r>
-              <a:rPr lang="en-US" dirty="0"/>
-              <a:t> We also removed common words, or stop words, during preprocessing. But what if the number of stop words or their specific usage patterns actually contribute to identifying fake news? These patterns could be used as additional features in the model."</a:t>
-            </a:r>
-          </a:p>
-          <a:p>
-            <a:r>
-              <a:rPr lang="en-US" b="1" dirty="0"/>
-              <a:t>Dataset Simplicity:</a:t>
-            </a:r>
-            <a:endParaRPr lang="en-US" dirty="0"/>
-          </a:p>
-          <a:p>
-            <a:pPr>
-              <a:buFont typeface="Arial" panose="020B0604020202020204" pitchFamily="34" charset="0"/>
-              <a:buChar char="•"/>
-            </a:pPr>
-            <a:r>
-              <a:rPr lang="en-US" b="1" dirty="0"/>
-              <a:t>"Dataset Simplicity:</a:t>
-            </a:r>
-            <a:r>
-              <a:rPr lang="en-US" dirty="0"/>
-              <a:t> Our dataset is quite simple, with just four columns, two of which we used. However, real-world news articles have other potentially valuable metadata like the news source, date, and author. These additional variables might provide richer context and help improve the model's accuracy."</a:t>
-            </a:r>
-          </a:p>
-          <a:p>
-            <a:r>
-              <a:rPr lang="en-US" b="1" dirty="0"/>
-              <a:t>Oversampling of US Data:</a:t>
-            </a:r>
-            <a:endParaRPr lang="en-US" dirty="0"/>
-          </a:p>
-          <a:p>
-            <a:pPr>
-              <a:buFont typeface="Arial" panose="020B0604020202020204" pitchFamily="34" charset="0"/>
-              <a:buChar char="•"/>
-            </a:pPr>
-            <a:r>
-              <a:rPr lang="en-US" b="1" dirty="0"/>
-              <a:t>"Oversampling of US Data:</a:t>
-            </a:r>
-            <a:r>
-              <a:rPr lang="en-US" dirty="0"/>
-              <a:t> Lastly, our dataset is heavily skewed towards US-based news. This bias could influence the model's performance on non-US news, potentially leading to misclassification."</a:t>
-            </a:r>
-          </a:p>
-        </p:txBody>
-      </p:sp>
-      <p:sp>
-        <p:nvSpPr>
-          <p:cNvPr id="4" name="Slide Number Placeholder 3"/>
-          <p:cNvSpPr>
-            <a:spLocks noGrp="1"/>
-          </p:cNvSpPr>
-          <p:nvPr>
-            <p:ph type="sldNum" sz="quarter" idx="5"/>
-          </p:nvPr>
-        </p:nvSpPr>
-        <p:spPr/>
-        <p:txBody>
-          <a:bodyPr/>
-          <a:lstStyle/>
-          <a:p>
-            <a:fld id="{C7B266E1-CF86-4AAB-956B-04E1E502B720}" type="slidenum">
-              <a:rPr lang="en-US" smtClean="0"/>
-              <a:t>11</a:t>
-            </a:fld>
-            <a:endParaRPr lang="en-US"/>
-          </a:p>
-        </p:txBody>
-      </p:sp>
-    </p:spTree>
-    <p:extLst>
-      <p:ext uri="{BB962C8B-B14F-4D97-AF65-F5344CB8AC3E}">
-        <p14:creationId xmlns:p14="http://schemas.microsoft.com/office/powerpoint/2010/main" val="3880516443"/>
-      </p:ext>
-    </p:extLst>
-  </p:cSld>
-  <p:clrMapOvr>
-    <a:masterClrMapping/>
-  </p:clrMapOvr>
-</p:notes>
-</file>
-
-<file path=ppt/notesSlides/notesSlide12.xml><?xml version="1.0" encoding="utf-8"?>
-<p:notes xmlns:a="http://schemas.openxmlformats.org/drawingml/2006/main" xmlns:r="http://schemas.openxmlformats.org/officeDocument/2006/relationships" xmlns:p="http://schemas.openxmlformats.org/presentationml/2006/main">
-  <p:cSld>
-    <p:spTree>
-      <p:nvGrpSpPr>
-        <p:cNvPr id="1" name=""/>
-        <p:cNvGrpSpPr/>
-        <p:nvPr/>
-      </p:nvGrpSpPr>
-      <p:grpSpPr>
-        <a:xfrm>
-          <a:off x="0" y="0"/>
-          <a:ext cx="0" cy="0"/>
-          <a:chOff x="0" y="0"/>
-          <a:chExt cx="0" cy="0"/>
-        </a:xfrm>
-      </p:grpSpPr>
-      <p:sp>
-        <p:nvSpPr>
-          <p:cNvPr id="2" name="Slide Image Placeholder 1"/>
-          <p:cNvSpPr>
-            <a:spLocks noGrp="1" noRot="1" noChangeAspect="1"/>
-          </p:cNvSpPr>
-          <p:nvPr>
-            <p:ph type="sldImg"/>
-          </p:nvPr>
-        </p:nvSpPr>
-        <p:spPr/>
-      </p:sp>
-      <p:sp>
-        <p:nvSpPr>
-          <p:cNvPr id="3" name="Notes Placeholder 2"/>
-          <p:cNvSpPr>
-            <a:spLocks noGrp="1"/>
-          </p:cNvSpPr>
-          <p:nvPr>
-            <p:ph type="body" idx="1"/>
-          </p:nvPr>
-        </p:nvSpPr>
-        <p:spPr/>
-        <p:txBody>
-          <a:bodyPr/>
-          <a:lstStyle/>
-          <a:p>
-            <a:pPr marL="0" marR="0" lvl="0" indent="0" algn="l" defTabSz="914400" rtl="0" eaLnBrk="1" fontAlgn="auto" latinLnBrk="0" hangingPunct="1">
-              <a:lnSpc>
-                <a:spcPct val="100000"/>
-              </a:lnSpc>
-              <a:spcBef>
-                <a:spcPts val="0"/>
-              </a:spcBef>
-              <a:spcAft>
-                <a:spcPts val="0"/>
-              </a:spcAft>
-              <a:buClrTx/>
-              <a:buSzTx/>
-              <a:buFontTx/>
-              <a:buNone/>
-              <a:tabLst/>
-              <a:defRPr/>
-            </a:pPr>
-            <a:r>
-              <a:rPr lang="en-US" b="1" dirty="0"/>
-              <a:t>Presenter: </a:t>
-            </a:r>
-            <a:r>
-              <a:rPr lang="en-US" b="0" dirty="0"/>
-              <a:t>Wendy</a:t>
-            </a:r>
-          </a:p>
-          <a:p>
-            <a:endParaRPr lang="en-US" dirty="0"/>
-          </a:p>
-          <a:p>
-            <a:r>
-              <a:rPr lang="en-US" dirty="0"/>
-              <a:t>Looking ahead, our enhancements focus on four key areas. First, we’ll improve </a:t>
-            </a:r>
-            <a:r>
-              <a:rPr lang="en-US" b="1" dirty="0"/>
-              <a:t>Data Input</a:t>
-            </a:r>
-            <a:r>
-              <a:rPr lang="en-US" dirty="0"/>
-              <a:t> by supporting diverse languages, integrating rich metadata, and balancing our dataset. Next, in </a:t>
-            </a:r>
-            <a:r>
-              <a:rPr lang="en-US" b="1" dirty="0"/>
-              <a:t>Pre-Processing</a:t>
-            </a:r>
-            <a:r>
-              <a:rPr lang="en-US" dirty="0"/>
-              <a:t>, we’ll refine feature engineering by incorporating punctuation and grammar analysis, and leveraging semantic and stop words features. For </a:t>
-            </a:r>
-            <a:r>
-              <a:rPr lang="en-US" b="1" dirty="0"/>
-              <a:t>Model Enhancements</a:t>
-            </a:r>
-            <a:r>
-              <a:rPr lang="en-US" dirty="0"/>
-              <a:t>, we aim to develop context-aware models that can scale effectively. Finally, we’ll establish a </a:t>
-            </a:r>
-            <a:r>
-              <a:rPr lang="en-US" b="1" dirty="0"/>
-              <a:t>Continuous Learning</a:t>
-            </a:r>
-            <a:r>
-              <a:rPr lang="en-US" dirty="0"/>
-              <a:t> loop with real-time feedback and maintain ethical transparency throughout. These steps will drive our model toward more sophisticated, common-sense decision-making.</a:t>
-            </a:r>
-            <a:r>
-              <a:rPr lang="en-US" dirty="0">
-                <a:sym typeface="Wingdings" panose="05000000000000000000" pitchFamily="2" charset="2"/>
-              </a:rPr>
-              <a:t> </a:t>
-            </a:r>
-            <a:endParaRPr lang="en-US" dirty="0"/>
-          </a:p>
-        </p:txBody>
-      </p:sp>
-      <p:sp>
-        <p:nvSpPr>
-          <p:cNvPr id="4" name="Slide Number Placeholder 3"/>
-          <p:cNvSpPr>
-            <a:spLocks noGrp="1"/>
-          </p:cNvSpPr>
-          <p:nvPr>
-            <p:ph type="sldNum" sz="quarter" idx="5"/>
-          </p:nvPr>
-        </p:nvSpPr>
-        <p:spPr/>
-        <p:txBody>
-          <a:bodyPr/>
-          <a:lstStyle/>
-          <a:p>
-            <a:fld id="{C7B266E1-CF86-4AAB-956B-04E1E502B720}" type="slidenum">
-              <a:rPr lang="en-US" smtClean="0"/>
-              <a:t>12</a:t>
             </a:fld>
             <a:endParaRPr lang="en-US"/>
           </a:p>
@@ -5494,7 +5008,7 @@
             </a:r>
             <a:r>
               <a:rPr lang="en-US" b="0" dirty="0"/>
-              <a:t>Sin</a:t>
+              <a:t>Uth</a:t>
             </a:r>
           </a:p>
           <a:p>
@@ -5505,9 +5019,6 @@
               <a:rPr lang="en-US" dirty="0"/>
               <a:t>[Script]</a:t>
             </a:r>
-          </a:p>
-          <a:p>
-            <a:endParaRPr lang="en-US" dirty="0"/>
           </a:p>
         </p:txBody>
       </p:sp>
@@ -5526,7 +5037,7 @@
           <a:bodyPr/>
           <a:lstStyle/>
           <a:p>
-            <a:fld id="{C7B266E1-CF86-4AAB-956B-04E1E502B720}" type="slidenum">
+            <a:fld id="{C4AAFCCC-0693-46BF-8425-81CACD7D9CCB}" type="slidenum">
               <a:rPr lang="en-US" smtClean="0"/>
               <a:t>2</a:t>
             </a:fld>
@@ -5537,7 +5048,7 @@
     </p:spTree>
     <p:extLst>
       <p:ext uri="{BB962C8B-B14F-4D97-AF65-F5344CB8AC3E}">
-        <p14:creationId xmlns:p14="http://schemas.microsoft.com/office/powerpoint/2010/main" val="3635364413"/>
+        <p14:creationId xmlns:p14="http://schemas.microsoft.com/office/powerpoint/2010/main" val="70151441"/>
       </p:ext>
     </p:extLst>
   </p:cSld>
@@ -5614,7 +5125,7 @@
             </a:r>
             <a:r>
               <a:rPr lang="en-US" b="0" dirty="0"/>
-              <a:t>Sin</a:t>
+              <a:t>Uth</a:t>
             </a:r>
           </a:p>
           <a:p>
@@ -5625,9 +5136,6 @@
               <a:rPr lang="en-US" dirty="0"/>
               <a:t>[Script]</a:t>
             </a:r>
-          </a:p>
-          <a:p>
-            <a:endParaRPr lang="en-US" dirty="0"/>
           </a:p>
         </p:txBody>
       </p:sp>
@@ -5646,7 +5154,7 @@
           <a:bodyPr/>
           <a:lstStyle/>
           <a:p>
-            <a:fld id="{C7B266E1-CF86-4AAB-956B-04E1E502B720}" type="slidenum">
+            <a:fld id="{C4AAFCCC-0693-46BF-8425-81CACD7D9CCB}" type="slidenum">
               <a:rPr lang="en-US" smtClean="0"/>
               <a:t>3</a:t>
             </a:fld>
@@ -5657,7 +5165,7 @@
     </p:spTree>
     <p:extLst>
       <p:ext uri="{BB962C8B-B14F-4D97-AF65-F5344CB8AC3E}">
-        <p14:creationId xmlns:p14="http://schemas.microsoft.com/office/powerpoint/2010/main" val="974814739"/>
+        <p14:creationId xmlns:p14="http://schemas.microsoft.com/office/powerpoint/2010/main" val="3398890254"/>
       </p:ext>
     </p:extLst>
   </p:cSld>
@@ -5746,6 +5254,9 @@
               <a:t>[Script]</a:t>
             </a:r>
           </a:p>
+          <a:p>
+            <a:endParaRPr lang="en-US" dirty="0"/>
+          </a:p>
         </p:txBody>
       </p:sp>
       <p:sp>
@@ -5763,7 +5274,7 @@
           <a:bodyPr/>
           <a:lstStyle/>
           <a:p>
-            <a:fld id="{C4AAFCCC-0693-46BF-8425-81CACD7D9CCB}" type="slidenum">
+            <a:fld id="{C7B266E1-CF86-4AAB-956B-04E1E502B720}" type="slidenum">
               <a:rPr lang="en-US" smtClean="0"/>
               <a:t>4</a:t>
             </a:fld>
@@ -5774,7 +5285,7 @@
     </p:spTree>
     <p:extLst>
       <p:ext uri="{BB962C8B-B14F-4D97-AF65-F5344CB8AC3E}">
-        <p14:creationId xmlns:p14="http://schemas.microsoft.com/office/powerpoint/2010/main" val="70151441"/>
+        <p14:creationId xmlns:p14="http://schemas.microsoft.com/office/powerpoint/2010/main" val="917270345"/>
       </p:ext>
     </p:extLst>
   </p:cSld>
@@ -5863,6 +5374,9 @@
               <a:t>[Script]</a:t>
             </a:r>
           </a:p>
+          <a:p>
+            <a:endParaRPr lang="en-US" dirty="0"/>
+          </a:p>
         </p:txBody>
       </p:sp>
       <p:sp>
@@ -5880,7 +5394,7 @@
           <a:bodyPr/>
           <a:lstStyle/>
           <a:p>
-            <a:fld id="{C4AAFCCC-0693-46BF-8425-81CACD7D9CCB}" type="slidenum">
+            <a:fld id="{C7B266E1-CF86-4AAB-956B-04E1E502B720}" type="slidenum">
               <a:rPr lang="en-US" smtClean="0"/>
               <a:t>5</a:t>
             </a:fld>
@@ -5891,7 +5405,7 @@
     </p:spTree>
     <p:extLst>
       <p:ext uri="{BB962C8B-B14F-4D97-AF65-F5344CB8AC3E}">
-        <p14:creationId xmlns:p14="http://schemas.microsoft.com/office/powerpoint/2010/main" val="3398890254"/>
+        <p14:creationId xmlns:p14="http://schemas.microsoft.com/office/powerpoint/2010/main" val="1219913740"/>
       </p:ext>
     </p:extLst>
   </p:cSld>
@@ -5968,7 +5482,7 @@
             </a:r>
             <a:r>
               <a:rPr lang="en-US" b="0" dirty="0"/>
-              <a:t>Uth</a:t>
+              <a:t>Tammy</a:t>
             </a:r>
           </a:p>
           <a:p>
@@ -6011,7 +5525,7 @@
     </p:spTree>
     <p:extLst>
       <p:ext uri="{BB962C8B-B14F-4D97-AF65-F5344CB8AC3E}">
-        <p14:creationId xmlns:p14="http://schemas.microsoft.com/office/powerpoint/2010/main" val="917270345"/>
+        <p14:creationId xmlns:p14="http://schemas.microsoft.com/office/powerpoint/2010/main" val="324516485"/>
       </p:ext>
     </p:extLst>
   </p:cSld>
@@ -6088,7 +5602,7 @@
             </a:r>
             <a:r>
               <a:rPr lang="en-US" b="0" dirty="0"/>
-              <a:t>Uth</a:t>
+              <a:t>Tammy</a:t>
             </a:r>
           </a:p>
           <a:p>
@@ -6098,6 +5612,97 @@
             <a:r>
               <a:rPr lang="en-US" dirty="0"/>
               <a:t>[Script]</a:t>
+            </a:r>
+          </a:p>
+          <a:p>
+            <a:endParaRPr lang="en-US" b="1" dirty="0"/>
+          </a:p>
+          <a:p>
+            <a:endParaRPr lang="en-US" b="1" dirty="0"/>
+          </a:p>
+          <a:p>
+            <a:r>
+              <a:rPr lang="en-US" b="1" dirty="0"/>
+              <a:t>Machine Learning Models Overview</a:t>
+            </a:r>
+          </a:p>
+          <a:p>
+            <a:endParaRPr lang="en-US" b="1" dirty="0"/>
+          </a:p>
+          <a:p>
+            <a:r>
+              <a:rPr lang="en-US" b="1" dirty="0"/>
+              <a:t>Traditional Machine Learning Models</a:t>
+            </a:r>
+          </a:p>
+          <a:p>
+            <a:pPr>
+              <a:buFont typeface="Arial" panose="020B0604020202020204" pitchFamily="34" charset="0"/>
+              <a:buChar char="•"/>
+            </a:pPr>
+            <a:r>
+              <a:rPr lang="en-US" b="1" dirty="0"/>
+              <a:t> Logistic Regression</a:t>
+            </a:r>
+            <a:r>
+              <a:rPr lang="en-US" dirty="0"/>
+              <a:t>: Best for binary classification, interpretable, fast, assumes linearity between features and output.</a:t>
+            </a:r>
+          </a:p>
+          <a:p>
+            <a:pPr>
+              <a:buFont typeface="Arial" panose="020B0604020202020204" pitchFamily="34" charset="0"/>
+              <a:buChar char="•"/>
+            </a:pPr>
+            <a:r>
+              <a:rPr lang="en-US" b="1" dirty="0"/>
+              <a:t> K-Nearest Neighbors (KNN)</a:t>
+            </a:r>
+            <a:r>
+              <a:rPr lang="en-US" dirty="0"/>
+              <a:t>: Non-parametric, simple, depends on distance metric, sensitive to the choice of K.</a:t>
+            </a:r>
+          </a:p>
+          <a:p>
+            <a:pPr>
+              <a:buFont typeface="Arial" panose="020B0604020202020204" pitchFamily="34" charset="0"/>
+              <a:buChar char="•"/>
+            </a:pPr>
+            <a:r>
+              <a:rPr lang="en-US" b="1" dirty="0"/>
+              <a:t> Support Vector Machine (SVM)</a:t>
+            </a:r>
+            <a:r>
+              <a:rPr lang="en-US" dirty="0"/>
+              <a:t>: Effective in high-dimensional spaces, robust to outliers, requires careful tuning of parameters.</a:t>
+            </a:r>
+          </a:p>
+          <a:p>
+            <a:pPr>
+              <a:buFont typeface="Arial" panose="020B0604020202020204" pitchFamily="34" charset="0"/>
+              <a:buChar char="•"/>
+            </a:pPr>
+            <a:r>
+              <a:rPr lang="en-US" b="1" dirty="0"/>
+              <a:t> Decision Tree</a:t>
+            </a:r>
+            <a:r>
+              <a:rPr lang="en-US" dirty="0"/>
+              <a:t>: Easy to visualize and interpret, prone to overfitting, works well with categorical and continuous data.</a:t>
+            </a:r>
+          </a:p>
+          <a:p>
+            <a:pPr>
+              <a:buFont typeface="Arial" panose="020B0604020202020204" pitchFamily="34" charset="0"/>
+              <a:buChar char="•"/>
+            </a:pPr>
+            <a:r>
+              <a:rPr lang="en-US" b="1" dirty="0"/>
+              <a:t> Random Forest</a:t>
+            </a:r>
+            <a:r>
+              <a:rPr lang="en-US" dirty="0"/>
+              <a:t>: Ensemble method of decision trees, reduces overfitting, handles large datasets well, less interpretable.</a:t>
             </a:r>
           </a:p>
           <a:p>
@@ -6131,7 +5736,7 @@
     </p:spTree>
     <p:extLst>
       <p:ext uri="{BB962C8B-B14F-4D97-AF65-F5344CB8AC3E}">
-        <p14:creationId xmlns:p14="http://schemas.microsoft.com/office/powerpoint/2010/main" val="1219913740"/>
+        <p14:creationId xmlns:p14="http://schemas.microsoft.com/office/powerpoint/2010/main" val="4266088077"/>
       </p:ext>
     </p:extLst>
   </p:cSld>
@@ -6208,20 +5813,187 @@
             </a:r>
             <a:r>
               <a:rPr lang="en-US" b="0" dirty="0"/>
-              <a:t>Tammy</a:t>
+              <a:t>Wendy</a:t>
             </a:r>
           </a:p>
           <a:p>
             <a:endParaRPr lang="en-US" dirty="0"/>
           </a:p>
           <a:p>
+            <a:pPr marL="0" marR="0" lvl="0" indent="0" algn="l" defTabSz="914400" rtl="0" eaLnBrk="1" fontAlgn="auto" latinLnBrk="0" hangingPunct="1">
+              <a:lnSpc>
+                <a:spcPct val="100000"/>
+              </a:lnSpc>
+              <a:spcBef>
+                <a:spcPts val="0"/>
+              </a:spcBef>
+              <a:spcAft>
+                <a:spcPts val="0"/>
+              </a:spcAft>
+              <a:buClrTx/>
+              <a:buSzTx/>
+              <a:buFontTx/>
+              <a:buNone/>
+              <a:tabLst/>
+              <a:defRPr/>
+            </a:pPr>
             <a:r>
               <a:rPr lang="en-US" dirty="0"/>
-              <a:t>[Script]</a:t>
+              <a:t>I am now going to showcase a false positive (type 1 error) example.</a:t>
             </a:r>
           </a:p>
           <a:p>
             <a:endParaRPr lang="en-US" dirty="0"/>
+          </a:p>
+          <a:p>
+            <a:r>
+              <a:rPr lang="en-US" dirty="0"/>
+              <a:t>Here I have some ‘realistic’ (but oh so fake) content generated in ChatGPT, which I have plugged into the model and true to form is yields that this is likely real news. </a:t>
+            </a:r>
+            <a:r>
+              <a:rPr lang="en-US" b="1" dirty="0">
+                <a:highlight>
+                  <a:srgbClr val="FFFF00"/>
+                </a:highlight>
+              </a:rPr>
+              <a:t>What do you think makes this a blatantly false article?</a:t>
+            </a:r>
+            <a:br>
+              <a:rPr lang="en-US" b="1" dirty="0">
+                <a:highlight>
+                  <a:srgbClr val="FFFF00"/>
+                </a:highlight>
+              </a:rPr>
+            </a:br>
+            <a:endParaRPr lang="en-US" b="1" dirty="0">
+              <a:highlight>
+                <a:srgbClr val="FFFF00"/>
+              </a:highlight>
+            </a:endParaRPr>
+          </a:p>
+          <a:p>
+            <a:r>
+              <a:rPr lang="en-US" b="1" dirty="0">
+                <a:highlight>
+                  <a:srgbClr val="FFFF00"/>
+                </a:highlight>
+              </a:rPr>
+              <a:t>Some examples:</a:t>
+            </a:r>
+            <a:br>
+              <a:rPr lang="en-US" dirty="0">
+                <a:highlight>
+                  <a:srgbClr val="FFFF00"/>
+                </a:highlight>
+              </a:rPr>
+            </a:br>
+            <a:r>
+              <a:rPr lang="en-US" b="1" dirty="0">
+                <a:highlight>
+                  <a:srgbClr val="FFFF00"/>
+                </a:highlight>
+              </a:rPr>
+              <a:t>Unusual Location for a Major Conservation Effort</a:t>
+            </a:r>
+            <a:endParaRPr lang="en-US" dirty="0">
+              <a:highlight>
+                <a:srgbClr val="FFFF00"/>
+              </a:highlight>
+            </a:endParaRPr>
+          </a:p>
+          <a:p>
+            <a:r>
+              <a:rPr lang="en-US" b="1" dirty="0">
+                <a:highlight>
+                  <a:srgbClr val="FFFF00"/>
+                </a:highlight>
+              </a:rPr>
+              <a:t>1. Inconsistent Timing:</a:t>
+            </a:r>
+            <a:endParaRPr lang="en-US" dirty="0">
+              <a:highlight>
+                <a:srgbClr val="FFFF00"/>
+              </a:highlight>
+            </a:endParaRPr>
+          </a:p>
+          <a:p>
+            <a:pPr>
+              <a:buFont typeface="Arial" panose="020B0604020202020204" pitchFamily="34" charset="0"/>
+              <a:buNone/>
+            </a:pPr>
+            <a:r>
+              <a:rPr lang="en-US" dirty="0"/>
+              <a:t>Breeding animals in captivity, including rabbits, has been common practice for decades. The claim of this being the first rabbit born in captivity in over a century is highly improbable.</a:t>
+            </a:r>
+          </a:p>
+          <a:p>
+            <a:r>
+              <a:rPr lang="en-US" b="1" dirty="0"/>
+              <a:t>2. Overly Dramatic Language</a:t>
+            </a:r>
+          </a:p>
+          <a:p>
+            <a:r>
+              <a:rPr lang="en-US" b="1" dirty="0"/>
+              <a:t>3. Lack of Specific Details About the Species</a:t>
+            </a:r>
+          </a:p>
+          <a:p>
+            <a:r>
+              <a:rPr lang="en-US" b="1" dirty="0"/>
+              <a:t>4. Absence of Credible Sources or References</a:t>
+            </a:r>
+          </a:p>
+          <a:p>
+            <a:r>
+              <a:rPr lang="en-US" b="1" dirty="0"/>
+              <a:t>5. Exaggerated Timeline and Effort</a:t>
+            </a:r>
+            <a:endParaRPr lang="en-US" dirty="0"/>
+          </a:p>
+          <a:p>
+            <a:pPr>
+              <a:buFont typeface="Arial" panose="020B0604020202020204" pitchFamily="34" charset="0"/>
+              <a:buNone/>
+            </a:pPr>
+            <a:r>
+              <a:rPr lang="en-US" dirty="0"/>
+              <a:t>Rabbits are not typically challenging to breed, so a decade of effort seems exaggerated and unrealistic.</a:t>
+            </a:r>
+          </a:p>
+          <a:p>
+            <a:r>
+              <a:rPr lang="en-US" b="1" dirty="0"/>
+              <a:t>6. Suspicious Details About the Zoo, Personnel and Innovative Techniques</a:t>
+            </a:r>
+            <a:endParaRPr lang="en-US" dirty="0"/>
+          </a:p>
+          <a:p>
+            <a:pPr>
+              <a:buFont typeface="Arial" panose="020B0604020202020204" pitchFamily="34" charset="0"/>
+              <a:buNone/>
+            </a:pPr>
+            <a:r>
+              <a:rPr lang="en-US" dirty="0"/>
+              <a:t>In genuine news stories, significant figures like a Chief Zookeeper involved in a major breakthrough would usually have some background details or credentials provided.</a:t>
+            </a:r>
+          </a:p>
+          <a:p>
+            <a:endParaRPr lang="en-US" dirty="0"/>
+          </a:p>
+          <a:p>
+            <a:r>
+              <a:rPr lang="en-US" dirty="0"/>
+              <a:t>[Go to </a:t>
+            </a:r>
+            <a:r>
+              <a:rPr lang="en-US" dirty="0" err="1"/>
+              <a:t>Streamlit</a:t>
+            </a:r>
+            <a:r>
+              <a:rPr lang="en-US" dirty="0"/>
+              <a:t>]</a:t>
+            </a:r>
           </a:p>
         </p:txBody>
       </p:sp>
@@ -6251,7 +6023,7 @@
     </p:spTree>
     <p:extLst>
       <p:ext uri="{BB962C8B-B14F-4D97-AF65-F5344CB8AC3E}">
-        <p14:creationId xmlns:p14="http://schemas.microsoft.com/office/powerpoint/2010/main" val="324516485"/>
+        <p14:creationId xmlns:p14="http://schemas.microsoft.com/office/powerpoint/2010/main" val="3303561258"/>
       </p:ext>
     </p:extLst>
   </p:cSld>
@@ -6328,7 +6100,7 @@
             </a:r>
             <a:r>
               <a:rPr lang="en-US" b="0" dirty="0"/>
-              <a:t>Tammy</a:t>
+              <a:t>Wendy</a:t>
             </a:r>
           </a:p>
           <a:p>
@@ -6336,30 +6108,31 @@
           </a:p>
           <a:p>
             <a:r>
+              <a:rPr lang="en-US" b="1" dirty="0"/>
+              <a:t>Introduction:</a:t>
+            </a:r>
+            <a:r>
               <a:rPr lang="en-US" dirty="0"/>
-              <a:t>[Script]</a:t>
-            </a:r>
-          </a:p>
-          <a:p>
-            <a:endParaRPr lang="en-US" b="1" dirty="0"/>
-          </a:p>
-          <a:p>
-            <a:endParaRPr lang="en-US" b="1" dirty="0"/>
-          </a:p>
-          <a:p>
+              <a:t> "Now that we've explored an example of a false positive, let's dive into some detective work. Can you tell me </a:t>
+            </a:r>
             <a:r>
               <a:rPr lang="en-US" b="1" dirty="0"/>
-              <a:t>Machine Learning Models Overview</a:t>
-            </a:r>
-          </a:p>
-          <a:p>
-            <a:endParaRPr lang="en-US" b="1" dirty="0"/>
+              <a:t>why our fake news predictor might have misclassified this article</a:t>
+            </a:r>
+            <a:r>
+              <a:rPr lang="en-US" dirty="0"/>
+              <a:t>.“</a:t>
+            </a:r>
+          </a:p>
+          <a:p>
+            <a:endParaRPr lang="en-US" dirty="0"/>
           </a:p>
           <a:p>
             <a:r>
               <a:rPr lang="en-US" b="1" dirty="0"/>
-              <a:t>Traditional Machine Learning Models</a:t>
-            </a:r>
+              <a:t>Language Considerations:</a:t>
+            </a:r>
+            <a:endParaRPr lang="en-US" dirty="0"/>
           </a:p>
           <a:p>
             <a:pPr>
@@ -6368,12 +6141,19 @@
             </a:pPr>
             <a:r>
               <a:rPr lang="en-US" b="1" dirty="0"/>
-              <a:t> Logistic Regression</a:t>
+              <a:t> "Language:</a:t>
             </a:r>
             <a:r>
               <a:rPr lang="en-US" dirty="0"/>
-              <a:t>: Best for binary classification, interpretable, fast, assumes linearity between features and output.</a:t>
-            </a:r>
+              <a:t> Our model is trained exclusively on English text, which means nuances in other languages aren't accounted for. This can limit the model's ability to generalize across different linguistic contexts."</a:t>
+            </a:r>
+          </a:p>
+          <a:p>
+            <a:r>
+              <a:rPr lang="en-US" b="1" dirty="0"/>
+              <a:t>Punctuation Removal:</a:t>
+            </a:r>
+            <a:endParaRPr lang="en-US" dirty="0"/>
           </a:p>
           <a:p>
             <a:pPr>
@@ -6382,12 +6162,19 @@
             </a:pPr>
             <a:r>
               <a:rPr lang="en-US" b="1" dirty="0"/>
-              <a:t> K-Nearest Neighbors (KNN)</a:t>
+              <a:t>"Punctuation:</a:t>
             </a:r>
             <a:r>
               <a:rPr lang="en-US" dirty="0"/>
-              <a:t>: Non-parametric, simple, depends on distance metric, sensitive to the choice of K.</a:t>
-            </a:r>
+              <a:t> In our preprocessing, we removed punctuation. However, this might remove important cues. Perhaps punctuation, especially in specific contexts, could serve as an indicator of authenticity or fabrication. Incorporating punctuation as a feature could be worth exploring."</a:t>
+            </a:r>
+          </a:p>
+          <a:p>
+            <a:r>
+              <a:rPr lang="en-US" b="1" dirty="0"/>
+              <a:t>Stop Words:</a:t>
+            </a:r>
+            <a:endParaRPr lang="en-US" dirty="0"/>
           </a:p>
           <a:p>
             <a:pPr>
@@ -6396,12 +6183,19 @@
             </a:pPr>
             <a:r>
               <a:rPr lang="en-US" b="1" dirty="0"/>
-              <a:t> Support Vector Machine (SVM)</a:t>
+              <a:t>"Stop Words:</a:t>
             </a:r>
             <a:r>
               <a:rPr lang="en-US" dirty="0"/>
-              <a:t>: Effective in high-dimensional spaces, robust to outliers, requires careful tuning of parameters.</a:t>
-            </a:r>
+              <a:t> We also removed common words, or stop words, during preprocessing. But what if the number of stop words or their specific usage patterns actually contribute to identifying fake news? These patterns could be used as additional features in the model."</a:t>
+            </a:r>
+          </a:p>
+          <a:p>
+            <a:r>
+              <a:rPr lang="en-US" b="1" dirty="0"/>
+              <a:t>Dataset Simplicity:</a:t>
+            </a:r>
+            <a:endParaRPr lang="en-US" dirty="0"/>
           </a:p>
           <a:p>
             <a:pPr>
@@ -6410,12 +6204,19 @@
             </a:pPr>
             <a:r>
               <a:rPr lang="en-US" b="1" dirty="0"/>
-              <a:t> Decision Tree</a:t>
+              <a:t>"Dataset Simplicity:</a:t>
             </a:r>
             <a:r>
               <a:rPr lang="en-US" dirty="0"/>
-              <a:t>: Easy to visualize and interpret, prone to overfitting, works well with categorical and continuous data.</a:t>
-            </a:r>
+              <a:t> Our dataset is quite simple, with just four columns, two of which we used. However, real-world news articles have other potentially valuable metadata like the news source, date, and author. These additional variables might provide richer context and help improve the model's accuracy."</a:t>
+            </a:r>
+          </a:p>
+          <a:p>
+            <a:r>
+              <a:rPr lang="en-US" b="1" dirty="0"/>
+              <a:t>Oversampling of US Data:</a:t>
+            </a:r>
+            <a:endParaRPr lang="en-US" dirty="0"/>
           </a:p>
           <a:p>
             <a:pPr>
@@ -6424,15 +6225,12 @@
             </a:pPr>
             <a:r>
               <a:rPr lang="en-US" b="1" dirty="0"/>
-              <a:t> Random Forest</a:t>
+              <a:t>"Oversampling of US Data:</a:t>
             </a:r>
             <a:r>
               <a:rPr lang="en-US" dirty="0"/>
-              <a:t>: Ensemble method of decision trees, reduces overfitting, handles large datasets well, less interpretable.</a:t>
-            </a:r>
-          </a:p>
-          <a:p>
-            <a:endParaRPr lang="en-US" dirty="0"/>
+              <a:t> Lastly, our dataset is heavily skewed towards US-based news. This bias could influence the model's performance on non-US news, potentially leading to misclassification."</a:t>
+            </a:r>
           </a:p>
         </p:txBody>
       </p:sp>
@@ -6462,7 +6260,7 @@
     </p:spTree>
     <p:extLst>
       <p:ext uri="{BB962C8B-B14F-4D97-AF65-F5344CB8AC3E}">
-        <p14:creationId xmlns:p14="http://schemas.microsoft.com/office/powerpoint/2010/main" val="4266088077"/>
+        <p14:creationId xmlns:p14="http://schemas.microsoft.com/office/powerpoint/2010/main" val="3880516443"/>
       </p:ext>
     </p:extLst>
   </p:cSld>
@@ -15382,778 +15180,6 @@
                 <a:latin typeface="Posterama" panose="020B0504020200020000" pitchFamily="34" charset="0"/>
                 <a:cs typeface="Posterama" panose="020B0504020200020000" pitchFamily="34" charset="0"/>
               </a:rPr>
-              <a:t>Warts and All</a:t>
-            </a:r>
-          </a:p>
-        </p:txBody>
-      </p:sp>
-      <p:pic>
-        <p:nvPicPr>
-          <p:cNvPr id="14" name="Picture 10" descr="Streamlit logo on light background">
-            <a:hlinkClick r:id="rId3"/>
-            <a:extLst>
-              <a:ext uri="{FF2B5EF4-FFF2-40B4-BE49-F238E27FC236}">
-                <a16:creationId xmlns:a16="http://schemas.microsoft.com/office/drawing/2014/main" id="{BBD83F7D-06E2-82DB-76F6-441F12ABE858}"/>
-              </a:ext>
-            </a:extLst>
-          </p:cNvPr>
-          <p:cNvPicPr>
-            <a:picLocks noChangeAspect="1" noChangeArrowheads="1"/>
-          </p:cNvPicPr>
-          <p:nvPr/>
-        </p:nvPicPr>
-        <p:blipFill>
-          <a:blip r:embed="rId4">
-            <a:extLst>
-              <a:ext uri="{28A0092B-C50C-407E-A947-70E740481C1C}">
-                <a14:useLocalDpi xmlns:a14="http://schemas.microsoft.com/office/drawing/2010/main" val="0"/>
-              </a:ext>
-            </a:extLst>
-          </a:blip>
-          <a:srcRect/>
-          <a:stretch>
-            <a:fillRect/>
-          </a:stretch>
-        </p:blipFill>
-        <p:spPr bwMode="auto">
-          <a:xfrm>
-            <a:off x="9018657" y="866213"/>
-            <a:ext cx="3259087" cy="904737"/>
-          </a:xfrm>
-          <a:prstGeom prst="rect">
-            <a:avLst/>
-          </a:prstGeom>
-          <a:noFill/>
-          <a:extLst>
-            <a:ext uri="{909E8E84-426E-40DD-AFC4-6F175D3DCCD1}">
-              <a14:hiddenFill xmlns:a14="http://schemas.microsoft.com/office/drawing/2010/main">
-                <a:solidFill>
-                  <a:srgbClr val="FFFFFF"/>
-                </a:solidFill>
-              </a14:hiddenFill>
-            </a:ext>
-          </a:extLst>
-        </p:spPr>
-      </p:pic>
-      <p:sp>
-        <p:nvSpPr>
-          <p:cNvPr id="4" name="TextBox 3">
-            <a:extLst>
-              <a:ext uri="{FF2B5EF4-FFF2-40B4-BE49-F238E27FC236}">
-                <a16:creationId xmlns:a16="http://schemas.microsoft.com/office/drawing/2014/main" id="{C612C28F-07DC-CD86-F5A9-8FED2AEDA360}"/>
-              </a:ext>
-            </a:extLst>
-          </p:cNvPr>
-          <p:cNvSpPr txBox="1"/>
-          <p:nvPr/>
-        </p:nvSpPr>
-        <p:spPr>
-          <a:xfrm>
-            <a:off x="330653" y="1737153"/>
-            <a:ext cx="11311617" cy="307777"/>
-          </a:xfrm>
-          <a:prstGeom prst="rect">
-            <a:avLst/>
-          </a:prstGeom>
-          <a:noFill/>
-        </p:spPr>
-        <p:txBody>
-          <a:bodyPr wrap="square">
-            <a:spAutoFit/>
-          </a:bodyPr>
-          <a:lstStyle/>
-          <a:p>
-            <a:r>
-              <a:rPr lang="en-US" sz="1400" b="1" dirty="0"/>
-              <a:t>Title:</a:t>
-            </a:r>
-            <a:r>
-              <a:rPr lang="en-US" sz="1400" dirty="0"/>
-              <a:t> Endangered </a:t>
-            </a:r>
-            <a:r>
-              <a:rPr lang="en-US" sz="1400" dirty="0">
-                <a:solidFill>
-                  <a:schemeClr val="tx2">
-                    <a:lumMod val="50000"/>
-                    <a:lumOff val="50000"/>
-                  </a:schemeClr>
-                </a:solidFill>
-              </a:rPr>
-              <a:t>Rabbit</a:t>
-            </a:r>
-            <a:r>
-              <a:rPr lang="en-US" sz="1400" dirty="0"/>
-              <a:t> Species Successfully Bred in Captivity at </a:t>
-            </a:r>
-            <a:r>
-              <a:rPr lang="en-US" sz="1400" dirty="0" err="1">
-                <a:solidFill>
-                  <a:schemeClr val="accent5">
-                    <a:lumMod val="60000"/>
-                    <a:lumOff val="40000"/>
-                  </a:schemeClr>
-                </a:solidFill>
-              </a:rPr>
-              <a:t>Sawubona</a:t>
-            </a:r>
-            <a:r>
-              <a:rPr lang="en-US" sz="1400" dirty="0">
-                <a:solidFill>
-                  <a:schemeClr val="accent5">
-                    <a:lumMod val="60000"/>
-                    <a:lumOff val="40000"/>
-                  </a:schemeClr>
-                </a:solidFill>
-              </a:rPr>
-              <a:t> Zoo</a:t>
-            </a:r>
-            <a:r>
-              <a:rPr lang="en-US" sz="1400" dirty="0"/>
-              <a:t>, South Africa</a:t>
-            </a:r>
-          </a:p>
-        </p:txBody>
-      </p:sp>
-      <p:cxnSp>
-        <p:nvCxnSpPr>
-          <p:cNvPr id="6" name="Straight Connector 5">
-            <a:extLst>
-              <a:ext uri="{FF2B5EF4-FFF2-40B4-BE49-F238E27FC236}">
-                <a16:creationId xmlns:a16="http://schemas.microsoft.com/office/drawing/2014/main" id="{E5FC21C3-833B-537B-CE14-B10DEF4632EF}"/>
-              </a:ext>
-            </a:extLst>
-          </p:cNvPr>
-          <p:cNvCxnSpPr/>
-          <p:nvPr/>
-        </p:nvCxnSpPr>
-        <p:spPr>
-          <a:xfrm>
-            <a:off x="330653" y="1608576"/>
-            <a:ext cx="11548383" cy="0"/>
-          </a:xfrm>
-          <a:prstGeom prst="line">
-            <a:avLst/>
-          </a:prstGeom>
-          <a:ln w="28575">
-            <a:solidFill>
-              <a:schemeClr val="bg1">
-                <a:lumMod val="75000"/>
-              </a:schemeClr>
-            </a:solidFill>
-          </a:ln>
-        </p:spPr>
-        <p:style>
-          <a:lnRef idx="2">
-            <a:schemeClr val="accent1"/>
-          </a:lnRef>
-          <a:fillRef idx="0">
-            <a:schemeClr val="accent1"/>
-          </a:fillRef>
-          <a:effectRef idx="1">
-            <a:schemeClr val="accent1"/>
-          </a:effectRef>
-          <a:fontRef idx="minor">
-            <a:schemeClr val="tx1"/>
-          </a:fontRef>
-        </p:style>
-      </p:cxnSp>
-      <p:cxnSp>
-        <p:nvCxnSpPr>
-          <p:cNvPr id="7" name="Straight Connector 6">
-            <a:extLst>
-              <a:ext uri="{FF2B5EF4-FFF2-40B4-BE49-F238E27FC236}">
-                <a16:creationId xmlns:a16="http://schemas.microsoft.com/office/drawing/2014/main" id="{386ECB88-AB53-0E64-8907-BED34FC452EC}"/>
-              </a:ext>
-            </a:extLst>
-          </p:cNvPr>
-          <p:cNvCxnSpPr/>
-          <p:nvPr/>
-        </p:nvCxnSpPr>
-        <p:spPr>
-          <a:xfrm>
-            <a:off x="330653" y="2152865"/>
-            <a:ext cx="11548383" cy="0"/>
-          </a:xfrm>
-          <a:prstGeom prst="line">
-            <a:avLst/>
-          </a:prstGeom>
-          <a:ln w="28575">
-            <a:solidFill>
-              <a:schemeClr val="bg1">
-                <a:lumMod val="75000"/>
-              </a:schemeClr>
-            </a:solidFill>
-          </a:ln>
-        </p:spPr>
-        <p:style>
-          <a:lnRef idx="2">
-            <a:schemeClr val="accent1"/>
-          </a:lnRef>
-          <a:fillRef idx="0">
-            <a:schemeClr val="accent1"/>
-          </a:fillRef>
-          <a:effectRef idx="1">
-            <a:schemeClr val="accent1"/>
-          </a:effectRef>
-          <a:fontRef idx="minor">
-            <a:schemeClr val="tx1"/>
-          </a:fontRef>
-        </p:style>
-      </p:cxnSp>
-      <p:sp>
-        <p:nvSpPr>
-          <p:cNvPr id="9" name="TextBox 8">
-            <a:extLst>
-              <a:ext uri="{FF2B5EF4-FFF2-40B4-BE49-F238E27FC236}">
-                <a16:creationId xmlns:a16="http://schemas.microsoft.com/office/drawing/2014/main" id="{2CF60653-D840-3EC4-0731-C1A32FBD4C73}"/>
-              </a:ext>
-            </a:extLst>
-          </p:cNvPr>
-          <p:cNvSpPr txBox="1"/>
-          <p:nvPr/>
-        </p:nvSpPr>
-        <p:spPr>
-          <a:xfrm>
-            <a:off x="330653" y="2254074"/>
-            <a:ext cx="11678467" cy="4401205"/>
-          </a:xfrm>
-          <a:prstGeom prst="rect">
-            <a:avLst/>
-          </a:prstGeom>
-          <a:noFill/>
-        </p:spPr>
-        <p:txBody>
-          <a:bodyPr wrap="square">
-            <a:spAutoFit/>
-          </a:bodyPr>
-          <a:lstStyle/>
-          <a:p>
-            <a:r>
-              <a:rPr lang="en-US" sz="1400" b="1" dirty="0"/>
-              <a:t>Article Text:</a:t>
-            </a:r>
-            <a:endParaRPr lang="en-US" sz="1400" dirty="0"/>
-          </a:p>
-          <a:p>
-            <a:r>
-              <a:rPr lang="en-US" sz="1400" dirty="0"/>
-              <a:t>In a monumental achievement for wildlife conservation, </a:t>
-            </a:r>
-            <a:r>
-              <a:rPr lang="en-US" sz="1400" dirty="0" err="1"/>
-              <a:t>Sawubona</a:t>
-            </a:r>
-            <a:r>
-              <a:rPr lang="en-US" sz="1400" dirty="0"/>
-              <a:t> Zoo in </a:t>
-            </a:r>
-            <a:r>
-              <a:rPr lang="en-US" sz="1400" dirty="0">
-                <a:solidFill>
-                  <a:schemeClr val="accent2">
-                    <a:lumMod val="75000"/>
-                  </a:schemeClr>
-                </a:solidFill>
-              </a:rPr>
-              <a:t>Port Shepstone</a:t>
-            </a:r>
-            <a:r>
-              <a:rPr lang="en-US" sz="1400" dirty="0"/>
-              <a:t>, South Africa, has successfully bred an endangered rabbit </a:t>
-            </a:r>
-            <a:r>
-              <a:rPr lang="en-US" sz="1400" dirty="0">
-                <a:solidFill>
-                  <a:schemeClr val="tx2">
-                    <a:lumMod val="50000"/>
-                    <a:lumOff val="50000"/>
-                  </a:schemeClr>
-                </a:solidFill>
-              </a:rPr>
-              <a:t>species</a:t>
-            </a:r>
-            <a:r>
-              <a:rPr lang="en-US" sz="1400" dirty="0"/>
-              <a:t> in captivity. This marks a significant breakthrough in efforts to conserve and protect the species, which has faced declining populations in the wild.</a:t>
-            </a:r>
-          </a:p>
-          <a:p>
-            <a:endParaRPr lang="en-US" sz="1400" dirty="0"/>
-          </a:p>
-          <a:p>
-            <a:pPr algn="just"/>
-            <a:r>
-              <a:rPr lang="en-US" sz="1400" dirty="0"/>
-              <a:t>The birth took place under the expert supervision of Thandeka Ndlovu, the Chief Zookeeper at </a:t>
-            </a:r>
-            <a:r>
-              <a:rPr lang="en-US" sz="1400" dirty="0" err="1"/>
-              <a:t>Sawubona</a:t>
-            </a:r>
-            <a:r>
-              <a:rPr lang="en-US" sz="1400" dirty="0"/>
-              <a:t> Zoo, who has led the conservation project for over a decade. "This is a milestone in our efforts to save this species from extinction," Ndlovu said. "Breeding rabbits in captivity has always been a challenge, but our team’s dedication and </a:t>
-            </a:r>
-            <a:r>
-              <a:rPr lang="en-US" sz="1400" dirty="0">
-                <a:solidFill>
-                  <a:schemeClr val="accent5">
-                    <a:lumMod val="60000"/>
-                    <a:lumOff val="40000"/>
-                  </a:schemeClr>
-                </a:solidFill>
-              </a:rPr>
-              <a:t>innovative techniques</a:t>
-            </a:r>
-            <a:r>
-              <a:rPr lang="en-US" sz="1400" dirty="0"/>
-              <a:t> have made this success possible.“</a:t>
-            </a:r>
-          </a:p>
-          <a:p>
-            <a:pPr algn="just"/>
-            <a:endParaRPr lang="en-US" sz="1400" dirty="0"/>
-          </a:p>
-          <a:p>
-            <a:r>
-              <a:rPr lang="en-US" sz="1400" dirty="0"/>
-              <a:t>The newborn rabbit, a member of a critically endangered species, is in excellent health and is already becoming accustomed to its new environment. The team at </a:t>
-            </a:r>
-            <a:r>
-              <a:rPr lang="en-US" sz="1400" dirty="0" err="1"/>
-              <a:t>Sawubona</a:t>
-            </a:r>
-            <a:r>
-              <a:rPr lang="en-US" sz="1400" dirty="0"/>
-              <a:t> Zoo has been working tirelessly to create conditions that mimic the rabbit's natural habitat, ensuring that the mother and her offspring are comfortable and secure.</a:t>
-            </a:r>
-          </a:p>
-          <a:p>
-            <a:endParaRPr lang="en-US" sz="1400" dirty="0"/>
-          </a:p>
-          <a:p>
-            <a:r>
-              <a:rPr lang="en-US" sz="1400" dirty="0"/>
-              <a:t>"We’ve been studying the behavioral patterns and needs of these rabbits for years, and this birth is the culmination of our hard work," Ndlovu explained. "This success gives us hope for the future of this species, and we’re excited to see what comes next.“ The zoo plans to continue its breeding program, with the hope of eventually reintroducing these rabbits into their natural habitats. </a:t>
-            </a:r>
-            <a:r>
-              <a:rPr lang="en-US" sz="1400" dirty="0" err="1"/>
-              <a:t>Sawubona</a:t>
-            </a:r>
-            <a:r>
-              <a:rPr lang="en-US" sz="1400" dirty="0"/>
-              <a:t> Zoo is inviting the public to learn more about the conservation efforts and to witness this rare and special event firsthand.</a:t>
-            </a:r>
-          </a:p>
-          <a:p>
-            <a:endParaRPr lang="en-US" sz="1400" dirty="0"/>
-          </a:p>
-          <a:p>
-            <a:r>
-              <a:rPr lang="en-US" sz="1400" dirty="0"/>
-              <a:t>The successful breeding at </a:t>
-            </a:r>
-            <a:r>
-              <a:rPr lang="en-US" sz="1400" dirty="0" err="1"/>
-              <a:t>Sawubona</a:t>
-            </a:r>
-            <a:r>
-              <a:rPr lang="en-US" sz="1400" dirty="0"/>
-              <a:t> Zoo is being hailed as a major step forward in the fight to protect endangered species. Thandeka Ndlovu and her team are committed to continuing their work to ensure that future generations will be able to witness these incredible animals in the wild.</a:t>
-            </a:r>
-          </a:p>
-        </p:txBody>
-      </p:sp>
-    </p:spTree>
-    <p:extLst>
-      <p:ext uri="{BB962C8B-B14F-4D97-AF65-F5344CB8AC3E}">
-        <p14:creationId xmlns:p14="http://schemas.microsoft.com/office/powerpoint/2010/main" val="1749171866"/>
-      </p:ext>
-    </p:extLst>
-  </p:cSld>
-  <p:clrMapOvr>
-    <a:masterClrMapping/>
-  </p:clrMapOvr>
-</p:sld>
-</file>
-
-<file path=ppt/slides/slide11.xml><?xml version="1.0" encoding="utf-8"?>
-<p:sld xmlns:a="http://schemas.openxmlformats.org/drawingml/2006/main" xmlns:r="http://schemas.openxmlformats.org/officeDocument/2006/relationships" xmlns:p="http://schemas.openxmlformats.org/presentationml/2006/main">
-  <p:cSld>
-    <p:spTree>
-      <p:nvGrpSpPr>
-        <p:cNvPr id="1" name=""/>
-        <p:cNvGrpSpPr/>
-        <p:nvPr/>
-      </p:nvGrpSpPr>
-      <p:grpSpPr>
-        <a:xfrm>
-          <a:off x="0" y="0"/>
-          <a:ext cx="0" cy="0"/>
-          <a:chOff x="0" y="0"/>
-          <a:chExt cx="0" cy="0"/>
-        </a:xfrm>
-      </p:grpSpPr>
-      <p:graphicFrame>
-        <p:nvGraphicFramePr>
-          <p:cNvPr id="7" name="think-cell data - do not delete" hidden="1">
-            <a:extLst>
-              <a:ext uri="{FF2B5EF4-FFF2-40B4-BE49-F238E27FC236}">
-                <a16:creationId xmlns:a16="http://schemas.microsoft.com/office/drawing/2014/main" id="{8920D5D8-F268-B530-4CA7-371DFB5553A6}"/>
-              </a:ext>
-            </a:extLst>
-          </p:cNvPr>
-          <p:cNvGraphicFramePr>
-            <a:graphicFrameLocks noChangeAspect="1"/>
-          </p:cNvGraphicFramePr>
-          <p:nvPr>
-            <p:custDataLst>
-              <p:tags r:id="rId1"/>
-            </p:custDataLst>
-            <p:extLst>
-              <p:ext uri="{D42A27DB-BD31-4B8C-83A1-F6EECF244321}">
-                <p14:modId xmlns:p14="http://schemas.microsoft.com/office/powerpoint/2010/main" val="4117187764"/>
-              </p:ext>
-            </p:extLst>
-          </p:nvPr>
-        </p:nvGraphicFramePr>
-        <p:xfrm>
-          <a:off x="1588" y="1588"/>
-          <a:ext cx="1588" cy="1588"/>
-        </p:xfrm>
-        <a:graphic>
-          <a:graphicData uri="http://schemas.openxmlformats.org/presentationml/2006/ole">
-            <mc:AlternateContent xmlns:mc="http://schemas.openxmlformats.org/markup-compatibility/2006">
-              <mc:Choice xmlns:v="urn:schemas-microsoft-com:vml" Requires="v">
-                <p:oleObj name="think-cell Slide" r:id="rId4" imgW="392" imgH="392" progId="TCLayout.ActiveDocument.1">
-                  <p:embed/>
-                </p:oleObj>
-              </mc:Choice>
-              <mc:Fallback>
-                <p:oleObj name="think-cell Slide" r:id="rId4" imgW="392" imgH="392" progId="TCLayout.ActiveDocument.1">
-                  <p:embed/>
-                  <p:pic>
-                    <p:nvPicPr>
-                      <p:cNvPr id="0" name=""/>
-                      <p:cNvPicPr/>
-                      <p:nvPr/>
-                    </p:nvPicPr>
-                    <p:blipFill>
-                      <a:blip r:embed="rId5"/>
-                      <a:stretch>
-                        <a:fillRect/>
-                      </a:stretch>
-                    </p:blipFill>
-                    <p:spPr>
-                      <a:xfrm>
-                        <a:off x="1588" y="1588"/>
-                        <a:ext cx="1588" cy="1588"/>
-                      </a:xfrm>
-                      <a:prstGeom prst="rect">
-                        <a:avLst/>
-                      </a:prstGeom>
-                    </p:spPr>
-                  </p:pic>
-                </p:oleObj>
-              </mc:Fallback>
-            </mc:AlternateContent>
-          </a:graphicData>
-        </a:graphic>
-      </p:graphicFrame>
-      <p:pic>
-        <p:nvPicPr>
-          <p:cNvPr id="5" name="Graphic 4" descr="Magnifying glass with solid fill">
-            <a:extLst>
-              <a:ext uri="{FF2B5EF4-FFF2-40B4-BE49-F238E27FC236}">
-                <a16:creationId xmlns:a16="http://schemas.microsoft.com/office/drawing/2014/main" id="{00ACA858-C885-EF74-F6B8-0896FFA318C1}"/>
-              </a:ext>
-            </a:extLst>
-          </p:cNvPr>
-          <p:cNvPicPr>
-            <a:picLocks noChangeAspect="1"/>
-          </p:cNvPicPr>
-          <p:nvPr/>
-        </p:nvPicPr>
-        <p:blipFill>
-          <a:blip r:embed="rId6">
-            <a:extLst>
-              <a:ext uri="{96DAC541-7B7A-43D3-8B79-37D633B846F1}">
-                <asvg:svgBlip xmlns:asvg="http://schemas.microsoft.com/office/drawing/2016/SVG/main" r:embed="rId7"/>
-              </a:ext>
-            </a:extLst>
-          </a:blip>
-          <a:stretch>
-            <a:fillRect/>
-          </a:stretch>
-        </p:blipFill>
-        <p:spPr>
-          <a:xfrm>
-            <a:off x="10514028" y="279431"/>
-            <a:ext cx="1469088" cy="1469088"/>
-          </a:xfrm>
-          <a:prstGeom prst="rect">
-            <a:avLst/>
-          </a:prstGeom>
-        </p:spPr>
-      </p:pic>
-      <p:sp>
-        <p:nvSpPr>
-          <p:cNvPr id="13" name="Title 1">
-            <a:extLst>
-              <a:ext uri="{FF2B5EF4-FFF2-40B4-BE49-F238E27FC236}">
-                <a16:creationId xmlns:a16="http://schemas.microsoft.com/office/drawing/2014/main" id="{A2794723-E065-BC39-2647-89E04F0EC9CF}"/>
-              </a:ext>
-            </a:extLst>
-          </p:cNvPr>
-          <p:cNvSpPr txBox="1">
-            <a:spLocks/>
-          </p:cNvSpPr>
-          <p:nvPr/>
-        </p:nvSpPr>
-        <p:spPr>
-          <a:xfrm>
-            <a:off x="0" y="-8876"/>
-            <a:ext cx="12191999" cy="963580"/>
-          </a:xfrm>
-          <a:prstGeom prst="rect">
-            <a:avLst/>
-          </a:prstGeom>
-          <a:solidFill>
-            <a:schemeClr val="tx1"/>
-          </a:solidFill>
-        </p:spPr>
-        <p:txBody>
-          <a:bodyPr anchor="b"/>
-          <a:lstStyle>
-            <a:lvl1pPr algn="l" defTabSz="914400" rtl="0" eaLnBrk="1" latinLnBrk="0" hangingPunct="1">
-              <a:lnSpc>
-                <a:spcPct val="90000"/>
-              </a:lnSpc>
-              <a:spcBef>
-                <a:spcPct val="0"/>
-              </a:spcBef>
-              <a:buNone/>
-              <a:defRPr sz="4400" kern="1200">
-                <a:solidFill>
-                  <a:schemeClr val="tx1"/>
-                </a:solidFill>
-                <a:latin typeface="+mj-lt"/>
-                <a:ea typeface="+mj-ea"/>
-                <a:cs typeface="+mj-cs"/>
-              </a:defRPr>
-            </a:lvl1pPr>
-          </a:lstStyle>
-          <a:p>
-            <a:r>
-              <a:rPr lang="en-AU" dirty="0">
-                <a:solidFill>
-                  <a:schemeClr val="bg1"/>
-                </a:solidFill>
-                <a:latin typeface="Posterama" panose="020B0504020200020000" pitchFamily="34" charset="0"/>
-                <a:cs typeface="Posterama" panose="020B0504020200020000" pitchFamily="34" charset="0"/>
-              </a:rPr>
-              <a:t>Let’s do some sleuthing…</a:t>
-            </a:r>
-          </a:p>
-        </p:txBody>
-      </p:sp>
-      <p:pic>
-        <p:nvPicPr>
-          <p:cNvPr id="6" name="Picture 5">
-            <a:extLst>
-              <a:ext uri="{FF2B5EF4-FFF2-40B4-BE49-F238E27FC236}">
-                <a16:creationId xmlns:a16="http://schemas.microsoft.com/office/drawing/2014/main" id="{3A0AD45B-024B-7EA4-525A-1555DB2940BB}"/>
-              </a:ext>
-            </a:extLst>
-          </p:cNvPr>
-          <p:cNvPicPr>
-            <a:picLocks noChangeAspect="1"/>
-          </p:cNvPicPr>
-          <p:nvPr/>
-        </p:nvPicPr>
-        <p:blipFill rotWithShape="1">
-          <a:blip r:embed="rId8"/>
-          <a:srcRect l="753" r="53071"/>
-          <a:stretch/>
-        </p:blipFill>
-        <p:spPr>
-          <a:xfrm>
-            <a:off x="47159" y="1699892"/>
-            <a:ext cx="6142404" cy="3618676"/>
-          </a:xfrm>
-          <a:prstGeom prst="rect">
-            <a:avLst/>
-          </a:prstGeom>
-        </p:spPr>
-      </p:pic>
-      <p:pic>
-        <p:nvPicPr>
-          <p:cNvPr id="2" name="Picture 1">
-            <a:extLst>
-              <a:ext uri="{FF2B5EF4-FFF2-40B4-BE49-F238E27FC236}">
-                <a16:creationId xmlns:a16="http://schemas.microsoft.com/office/drawing/2014/main" id="{60302D96-A22F-0177-B1CE-4A992A439DB4}"/>
-              </a:ext>
-            </a:extLst>
-          </p:cNvPr>
-          <p:cNvPicPr>
-            <a:picLocks noChangeAspect="1"/>
-          </p:cNvPicPr>
-          <p:nvPr/>
-        </p:nvPicPr>
-        <p:blipFill rotWithShape="1">
-          <a:blip r:embed="rId8"/>
-          <a:srcRect l="53823"/>
-          <a:stretch/>
-        </p:blipFill>
-        <p:spPr>
-          <a:xfrm>
-            <a:off x="6069186" y="1655426"/>
-            <a:ext cx="6142404" cy="3618676"/>
-          </a:xfrm>
-          <a:prstGeom prst="rect">
-            <a:avLst/>
-          </a:prstGeom>
-        </p:spPr>
-      </p:pic>
-      <p:sp>
-        <p:nvSpPr>
-          <p:cNvPr id="8" name="Oval 7">
-            <a:extLst>
-              <a:ext uri="{FF2B5EF4-FFF2-40B4-BE49-F238E27FC236}">
-                <a16:creationId xmlns:a16="http://schemas.microsoft.com/office/drawing/2014/main" id="{E3AD0EF1-D4F7-73CD-66FE-391EC0DA5B3C}"/>
-              </a:ext>
-            </a:extLst>
-          </p:cNvPr>
-          <p:cNvSpPr/>
-          <p:nvPr/>
-        </p:nvSpPr>
-        <p:spPr>
-          <a:xfrm>
-            <a:off x="10637520" y="411292"/>
-            <a:ext cx="929166" cy="945067"/>
-          </a:xfrm>
-          <a:prstGeom prst="ellipse">
-            <a:avLst/>
-          </a:prstGeom>
-          <a:noFill/>
-          <a:ln>
-            <a:solidFill>
-              <a:schemeClr val="bg1"/>
-            </a:solidFill>
-          </a:ln>
-        </p:spPr>
-        <p:style>
-          <a:lnRef idx="2">
-            <a:schemeClr val="accent1">
-              <a:shade val="15000"/>
-            </a:schemeClr>
-          </a:lnRef>
-          <a:fillRef idx="1">
-            <a:schemeClr val="accent1"/>
-          </a:fillRef>
-          <a:effectRef idx="0">
-            <a:schemeClr val="accent1"/>
-          </a:effectRef>
-          <a:fontRef idx="minor">
-            <a:schemeClr val="lt1"/>
-          </a:fontRef>
-        </p:style>
-        <p:txBody>
-          <a:bodyPr rtlCol="0" anchor="ctr"/>
-          <a:lstStyle/>
-          <a:p>
-            <a:pPr algn="ctr"/>
-            <a:endParaRPr lang="en-US"/>
-          </a:p>
-        </p:txBody>
-      </p:sp>
-    </p:spTree>
-    <p:extLst>
-      <p:ext uri="{BB962C8B-B14F-4D97-AF65-F5344CB8AC3E}">
-        <p14:creationId xmlns:p14="http://schemas.microsoft.com/office/powerpoint/2010/main" val="153390708"/>
-      </p:ext>
-    </p:extLst>
-  </p:cSld>
-  <p:clrMapOvr>
-    <a:masterClrMapping/>
-  </p:clrMapOvr>
-</p:sld>
-</file>
-
-<file path=ppt/slides/slide12.xml><?xml version="1.0" encoding="utf-8"?>
-<p:sld xmlns:a="http://schemas.openxmlformats.org/drawingml/2006/main" xmlns:r="http://schemas.openxmlformats.org/officeDocument/2006/relationships" xmlns:p="http://schemas.openxmlformats.org/presentationml/2006/main">
-  <p:cSld>
-    <p:spTree>
-      <p:nvGrpSpPr>
-        <p:cNvPr id="1" name=""/>
-        <p:cNvGrpSpPr/>
-        <p:nvPr/>
-      </p:nvGrpSpPr>
-      <p:grpSpPr>
-        <a:xfrm>
-          <a:off x="0" y="0"/>
-          <a:ext cx="0" cy="0"/>
-          <a:chOff x="0" y="0"/>
-          <a:chExt cx="0" cy="0"/>
-        </a:xfrm>
-      </p:grpSpPr>
-      <p:sp>
-        <p:nvSpPr>
-          <p:cNvPr id="13" name="Title 1">
-            <a:extLst>
-              <a:ext uri="{FF2B5EF4-FFF2-40B4-BE49-F238E27FC236}">
-                <a16:creationId xmlns:a16="http://schemas.microsoft.com/office/drawing/2014/main" id="{A2794723-E065-BC39-2647-89E04F0EC9CF}"/>
-              </a:ext>
-            </a:extLst>
-          </p:cNvPr>
-          <p:cNvSpPr txBox="1">
-            <a:spLocks/>
-          </p:cNvSpPr>
-          <p:nvPr/>
-        </p:nvSpPr>
-        <p:spPr>
-          <a:xfrm>
-            <a:off x="0" y="-8876"/>
-            <a:ext cx="12191999" cy="963580"/>
-          </a:xfrm>
-          <a:prstGeom prst="rect">
-            <a:avLst/>
-          </a:prstGeom>
-          <a:solidFill>
-            <a:schemeClr val="tx1"/>
-          </a:solidFill>
-        </p:spPr>
-        <p:txBody>
-          <a:bodyPr anchor="b"/>
-          <a:lstStyle>
-            <a:lvl1pPr algn="l" defTabSz="914400" rtl="0" eaLnBrk="1" latinLnBrk="0" hangingPunct="1">
-              <a:lnSpc>
-                <a:spcPct val="90000"/>
-              </a:lnSpc>
-              <a:spcBef>
-                <a:spcPct val="0"/>
-              </a:spcBef>
-              <a:buNone/>
-              <a:defRPr sz="4400" kern="1200">
-                <a:solidFill>
-                  <a:schemeClr val="tx1"/>
-                </a:solidFill>
-                <a:latin typeface="+mj-lt"/>
-                <a:ea typeface="+mj-ea"/>
-                <a:cs typeface="+mj-cs"/>
-              </a:defRPr>
-            </a:lvl1pPr>
-          </a:lstStyle>
-          <a:p>
-            <a:r>
-              <a:rPr lang="en-AU" dirty="0">
-                <a:solidFill>
-                  <a:schemeClr val="bg1"/>
-                </a:solidFill>
-                <a:latin typeface="Posterama" panose="020B0504020200020000" pitchFamily="34" charset="0"/>
-                <a:cs typeface="Posterama" panose="020B0504020200020000" pitchFamily="34" charset="0"/>
-              </a:rPr>
               <a:t>Future Enhancements</a:t>
             </a:r>
           </a:p>
@@ -16201,254 +15227,6 @@
 </file>
 
 <file path=ppt/slides/slide2.xml><?xml version="1.0" encoding="utf-8"?>
-<p:sld xmlns:a="http://schemas.openxmlformats.org/drawingml/2006/main" xmlns:r="http://schemas.openxmlformats.org/officeDocument/2006/relationships" xmlns:p="http://schemas.openxmlformats.org/presentationml/2006/main">
-  <p:cSld>
-    <p:spTree>
-      <p:nvGrpSpPr>
-        <p:cNvPr id="1" name=""/>
-        <p:cNvGrpSpPr/>
-        <p:nvPr/>
-      </p:nvGrpSpPr>
-      <p:grpSpPr>
-        <a:xfrm>
-          <a:off x="0" y="0"/>
-          <a:ext cx="0" cy="0"/>
-          <a:chOff x="0" y="0"/>
-          <a:chExt cx="0" cy="0"/>
-        </a:xfrm>
-      </p:grpSpPr>
-      <p:sp>
-        <p:nvSpPr>
-          <p:cNvPr id="3" name="TextBox 2">
-            <a:extLst>
-              <a:ext uri="{FF2B5EF4-FFF2-40B4-BE49-F238E27FC236}">
-                <a16:creationId xmlns:a16="http://schemas.microsoft.com/office/drawing/2014/main" id="{71AE09C8-43E5-1907-4ACF-704E4494BF2D}"/>
-              </a:ext>
-            </a:extLst>
-          </p:cNvPr>
-          <p:cNvSpPr txBox="1"/>
-          <p:nvPr/>
-        </p:nvSpPr>
-        <p:spPr>
-          <a:xfrm>
-            <a:off x="741396" y="420856"/>
-            <a:ext cx="6842028" cy="369332"/>
-          </a:xfrm>
-          <a:prstGeom prst="rect">
-            <a:avLst/>
-          </a:prstGeom>
-          <a:noFill/>
-        </p:spPr>
-        <p:txBody>
-          <a:bodyPr wrap="square" rtlCol="0">
-            <a:spAutoFit/>
-          </a:bodyPr>
-          <a:lstStyle/>
-          <a:p>
-            <a:r>
-              <a:rPr lang="en-AU" dirty="0"/>
-              <a:t>FAKE NEWS Predictor  &gt; the App unveiled using Streamlit.io</a:t>
-            </a:r>
-          </a:p>
-        </p:txBody>
-      </p:sp>
-      <p:pic>
-        <p:nvPicPr>
-          <p:cNvPr id="1026" name="Picture 2" descr="Streamlit logo">
-            <a:extLst>
-              <a:ext uri="{FF2B5EF4-FFF2-40B4-BE49-F238E27FC236}">
-                <a16:creationId xmlns:a16="http://schemas.microsoft.com/office/drawing/2014/main" id="{FD6B45EF-0D1E-1597-209E-8482F66400CF}"/>
-              </a:ext>
-            </a:extLst>
-          </p:cNvPr>
-          <p:cNvPicPr>
-            <a:picLocks noChangeAspect="1" noChangeArrowheads="1"/>
-          </p:cNvPicPr>
-          <p:nvPr/>
-        </p:nvPicPr>
-        <p:blipFill>
-          <a:blip r:embed="rId3">
-            <a:extLst>
-              <a:ext uri="{28A0092B-C50C-407E-A947-70E740481C1C}">
-                <a14:useLocalDpi xmlns:a14="http://schemas.microsoft.com/office/drawing/2010/main" val="0"/>
-              </a:ext>
-            </a:extLst>
-          </a:blip>
-          <a:srcRect/>
-          <a:stretch>
-            <a:fillRect/>
-          </a:stretch>
-        </p:blipFill>
-        <p:spPr bwMode="auto">
-          <a:xfrm>
-            <a:off x="9825228" y="-162312"/>
-            <a:ext cx="1905000" cy="1905000"/>
-          </a:xfrm>
-          <a:prstGeom prst="rect">
-            <a:avLst/>
-          </a:prstGeom>
-          <a:noFill/>
-          <a:extLst>
-            <a:ext uri="{909E8E84-426E-40DD-AFC4-6F175D3DCCD1}">
-              <a14:hiddenFill xmlns:a14="http://schemas.microsoft.com/office/drawing/2010/main">
-                <a:solidFill>
-                  <a:srgbClr val="FFFFFF"/>
-                </a:solidFill>
-              </a14:hiddenFill>
-            </a:ext>
-          </a:extLst>
-        </p:spPr>
-      </p:pic>
-    </p:spTree>
-    <p:extLst>
-      <p:ext uri="{BB962C8B-B14F-4D97-AF65-F5344CB8AC3E}">
-        <p14:creationId xmlns:p14="http://schemas.microsoft.com/office/powerpoint/2010/main" val="3471958581"/>
-      </p:ext>
-    </p:extLst>
-  </p:cSld>
-  <p:clrMapOvr>
-    <a:masterClrMapping/>
-  </p:clrMapOvr>
-</p:sld>
-</file>
-
-<file path=ppt/slides/slide3.xml><?xml version="1.0" encoding="utf-8"?>
-<p:sld xmlns:a="http://schemas.openxmlformats.org/drawingml/2006/main" xmlns:r="http://schemas.openxmlformats.org/officeDocument/2006/relationships" xmlns:p="http://schemas.openxmlformats.org/presentationml/2006/main">
-  <p:cSld>
-    <p:spTree>
-      <p:nvGrpSpPr>
-        <p:cNvPr id="1" name=""/>
-        <p:cNvGrpSpPr/>
-        <p:nvPr/>
-      </p:nvGrpSpPr>
-      <p:grpSpPr>
-        <a:xfrm>
-          <a:off x="0" y="0"/>
-          <a:ext cx="0" cy="0"/>
-          <a:chOff x="0" y="0"/>
-          <a:chExt cx="0" cy="0"/>
-        </a:xfrm>
-      </p:grpSpPr>
-      <p:sp>
-        <p:nvSpPr>
-          <p:cNvPr id="2" name="TextBox 1">
-            <a:extLst>
-              <a:ext uri="{FF2B5EF4-FFF2-40B4-BE49-F238E27FC236}">
-                <a16:creationId xmlns:a16="http://schemas.microsoft.com/office/drawing/2014/main" id="{A137827B-CE2E-B0A1-A5C5-8B8311E18A54}"/>
-              </a:ext>
-            </a:extLst>
-          </p:cNvPr>
-          <p:cNvSpPr txBox="1"/>
-          <p:nvPr/>
-        </p:nvSpPr>
-        <p:spPr>
-          <a:xfrm>
-            <a:off x="740780" y="613458"/>
-            <a:ext cx="1258708" cy="369332"/>
-          </a:xfrm>
-          <a:prstGeom prst="rect">
-            <a:avLst/>
-          </a:prstGeom>
-          <a:noFill/>
-        </p:spPr>
-        <p:txBody>
-          <a:bodyPr wrap="square" rtlCol="0">
-            <a:spAutoFit/>
-          </a:bodyPr>
-          <a:lstStyle/>
-          <a:p>
-            <a:r>
-              <a:rPr lang="en-AU" dirty="0"/>
-              <a:t>The Magic </a:t>
-            </a:r>
-          </a:p>
-        </p:txBody>
-      </p:sp>
-      <p:pic>
-        <p:nvPicPr>
-          <p:cNvPr id="4" name="Graphic 3" descr="Magic Wand Auto with solid fill">
-            <a:extLst>
-              <a:ext uri="{FF2B5EF4-FFF2-40B4-BE49-F238E27FC236}">
-                <a16:creationId xmlns:a16="http://schemas.microsoft.com/office/drawing/2014/main" id="{39D61A37-57D2-C0D8-9682-4E511BB825E6}"/>
-              </a:ext>
-            </a:extLst>
-          </p:cNvPr>
-          <p:cNvPicPr>
-            <a:picLocks noChangeAspect="1"/>
-          </p:cNvPicPr>
-          <p:nvPr/>
-        </p:nvPicPr>
-        <p:blipFill>
-          <a:blip r:embed="rId3">
-            <a:extLst>
-              <a:ext uri="{96DAC541-7B7A-43D3-8B79-37D633B846F1}">
-                <asvg:svgBlip xmlns:asvg="http://schemas.microsoft.com/office/drawing/2016/SVG/main" r:embed="rId4"/>
-              </a:ext>
-            </a:extLst>
-          </a:blip>
-          <a:stretch>
-            <a:fillRect/>
-          </a:stretch>
-        </p:blipFill>
-        <p:spPr>
-          <a:xfrm>
-            <a:off x="1703407" y="340924"/>
-            <a:ext cx="914400" cy="914400"/>
-          </a:xfrm>
-          <a:prstGeom prst="rect">
-            <a:avLst/>
-          </a:prstGeom>
-        </p:spPr>
-      </p:pic>
-      <p:sp>
-        <p:nvSpPr>
-          <p:cNvPr id="6" name="TextBox 5">
-            <a:extLst>
-              <a:ext uri="{FF2B5EF4-FFF2-40B4-BE49-F238E27FC236}">
-                <a16:creationId xmlns:a16="http://schemas.microsoft.com/office/drawing/2014/main" id="{ED2A28AB-8913-7F0B-4042-DDC89E77DCD0}"/>
-              </a:ext>
-            </a:extLst>
-          </p:cNvPr>
-          <p:cNvSpPr txBox="1"/>
-          <p:nvPr/>
-        </p:nvSpPr>
-        <p:spPr>
-          <a:xfrm>
-            <a:off x="2707473" y="428792"/>
-            <a:ext cx="2523280" cy="369332"/>
-          </a:xfrm>
-          <a:prstGeom prst="rect">
-            <a:avLst/>
-          </a:prstGeom>
-          <a:noFill/>
-        </p:spPr>
-        <p:txBody>
-          <a:bodyPr wrap="square" rtlCol="0">
-            <a:spAutoFit/>
-          </a:bodyPr>
-          <a:lstStyle/>
-          <a:p>
-            <a:r>
-              <a:rPr lang="en-AU" dirty="0"/>
-              <a:t>Our Process uncovered </a:t>
-            </a:r>
-          </a:p>
-        </p:txBody>
-      </p:sp>
-    </p:spTree>
-    <p:extLst>
-      <p:ext uri="{BB962C8B-B14F-4D97-AF65-F5344CB8AC3E}">
-        <p14:creationId xmlns:p14="http://schemas.microsoft.com/office/powerpoint/2010/main" val="3099477319"/>
-      </p:ext>
-    </p:extLst>
-  </p:cSld>
-  <p:clrMapOvr>
-    <a:masterClrMapping/>
-  </p:clrMapOvr>
-</p:sld>
-</file>
-
-<file path=ppt/slides/slide4.xml><?xml version="1.0" encoding="utf-8"?>
 <p:sld xmlns:a="http://schemas.openxmlformats.org/drawingml/2006/main" xmlns:r="http://schemas.openxmlformats.org/officeDocument/2006/relationships" xmlns:p="http://schemas.openxmlformats.org/presentationml/2006/main">
   <p:cSld>
     <p:spTree>
@@ -19282,7 +18060,7 @@
 </p:sld>
 </file>
 
-<file path=ppt/slides/slide5.xml><?xml version="1.0" encoding="utf-8"?>
+<file path=ppt/slides/slide3.xml><?xml version="1.0" encoding="utf-8"?>
 <p:sld xmlns:a="http://schemas.openxmlformats.org/drawingml/2006/main" xmlns:r="http://schemas.openxmlformats.org/officeDocument/2006/relationships" xmlns:p="http://schemas.openxmlformats.org/presentationml/2006/main">
   <p:cSld>
     <p:spTree>
@@ -19722,7 +18500,7 @@
         </p:nvGrpSpPr>
         <p:grpSpPr>
           <a:xfrm>
-            <a:off x="305019" y="1060515"/>
+            <a:off x="305019" y="1037655"/>
             <a:ext cx="4480560" cy="3445999"/>
             <a:chOff x="3683452" y="1060515"/>
             <a:chExt cx="4480560" cy="3445999"/>
@@ -19772,10 +18550,10 @@
           </p:nvGrpSpPr>
           <p:grpSpPr>
             <a:xfrm>
-              <a:off x="4506796" y="1575745"/>
-              <a:ext cx="1516380" cy="2522220"/>
-              <a:chOff x="9086416" y="1574925"/>
-              <a:chExt cx="1516380" cy="2522220"/>
+              <a:off x="4506796" y="1561677"/>
+              <a:ext cx="1516380" cy="2536288"/>
+              <a:chOff x="9086416" y="1560857"/>
+              <a:chExt cx="1516380" cy="2536288"/>
             </a:xfrm>
           </p:grpSpPr>
           <p:sp>
@@ -19846,7 +18624,7 @@
             </p:nvSpPr>
             <p:spPr>
               <a:xfrm>
-                <a:off x="9086416" y="1574925"/>
+                <a:off x="9086416" y="1560857"/>
                 <a:ext cx="1516380" cy="2522220"/>
               </a:xfrm>
               <a:prstGeom prst="rect">
@@ -20163,7 +18941,7 @@
 </p:sld>
 </file>
 
-<file path=ppt/slides/slide6.xml><?xml version="1.0" encoding="utf-8"?>
+<file path=ppt/slides/slide4.xml><?xml version="1.0" encoding="utf-8"?>
 <p:sld xmlns:a="http://schemas.openxmlformats.org/drawingml/2006/main" xmlns:r="http://schemas.openxmlformats.org/officeDocument/2006/relationships" xmlns:p="http://schemas.openxmlformats.org/presentationml/2006/main">
   <p:cSld>
     <p:spTree>
@@ -21061,7 +19839,7 @@
 </p:sld>
 </file>
 
-<file path=ppt/slides/slide7.xml><?xml version="1.0" encoding="utf-8"?>
+<file path=ppt/slides/slide5.xml><?xml version="1.0" encoding="utf-8"?>
 <p:sld xmlns:a="http://schemas.openxmlformats.org/drawingml/2006/main" xmlns:r="http://schemas.openxmlformats.org/officeDocument/2006/relationships" xmlns:p="http://schemas.openxmlformats.org/presentationml/2006/main">
   <p:cSld>
     <p:spTree>
@@ -22260,7 +21038,7 @@
 </p:sld>
 </file>
 
-<file path=ppt/slides/slide8.xml><?xml version="1.0" encoding="utf-8"?>
+<file path=ppt/slides/slide6.xml><?xml version="1.0" encoding="utf-8"?>
 <p:sld xmlns:a="http://schemas.openxmlformats.org/drawingml/2006/main" xmlns:r="http://schemas.openxmlformats.org/officeDocument/2006/relationships" xmlns:p="http://schemas.openxmlformats.org/presentationml/2006/main">
   <p:cSld>
     <p:spTree>
@@ -23213,7 +21991,7 @@
         <p:spPr>
           <a:xfrm>
             <a:off x="1199053" y="5378569"/>
-            <a:ext cx="1919705" cy="1228641"/>
+            <a:ext cx="2069927" cy="1228641"/>
           </a:xfrm>
           <a:prstGeom prst="rect">
             <a:avLst/>
@@ -23244,37 +22022,7 @@
           </a:bodyPr>
           <a:lstStyle/>
           <a:p>
-            <a:pPr defTabSz="488950">
-              <a:lnSpc>
-                <a:spcPct val="90000"/>
-              </a:lnSpc>
-              <a:spcBef>
-                <a:spcPct val="0"/>
-              </a:spcBef>
-              <a:spcAft>
-                <a:spcPct val="35000"/>
-              </a:spcAft>
-            </a:pPr>
-            <a:r>
-              <a:rPr lang="en-AU" sz="1400" dirty="0">
-                <a:solidFill>
-                  <a:schemeClr val="accent2">
-                    <a:lumMod val="50000"/>
-                  </a:schemeClr>
-                </a:solidFill>
-              </a:rPr>
-              <a:t>Logistic Regression</a:t>
-            </a:r>
-            <a:endParaRPr lang="en-AU" sz="1400" kern="1200" baseline="0" dirty="0">
-              <a:solidFill>
-                <a:schemeClr val="accent2">
-                  <a:lumMod val="50000"/>
-                </a:schemeClr>
-              </a:solidFill>
-            </a:endParaRPr>
-          </a:p>
-          <a:p>
-            <a:pPr marL="0" lvl="0" indent="0" defTabSz="488950">
+            <a:pPr marL="285750" indent="-285750" defTabSz="488950">
               <a:lnSpc>
                 <a:spcPct val="90000"/>
               </a:lnSpc>
@@ -23285,21 +22033,28 @@
                 <a:spcPct val="35000"/>
               </a:spcAft>
               <a:buFont typeface="Arial" panose="020B0604020202020204" pitchFamily="34" charset="0"/>
-              <a:buNone/>
+              <a:buChar char="•"/>
             </a:pPr>
             <a:r>
-              <a:rPr lang="en-AU" sz="1400" kern="1200" baseline="0" dirty="0">
+              <a:rPr lang="en-AU" sz="1400" dirty="0">
                 <a:solidFill>
                   <a:schemeClr val="accent2">
                     <a:lumMod val="50000"/>
                   </a:schemeClr>
                 </a:solidFill>
               </a:rPr>
-              <a:t>Support Vector Model</a:t>
-            </a:r>
-          </a:p>
-          <a:p>
-            <a:pPr marL="0" lvl="0" indent="0" defTabSz="488950">
+              <a:t>Logistic Regression</a:t>
+            </a:r>
+            <a:endParaRPr lang="en-AU" sz="1400" kern="1200" baseline="0" dirty="0">
+              <a:solidFill>
+                <a:schemeClr val="accent2">
+                  <a:lumMod val="50000"/>
+                </a:schemeClr>
+              </a:solidFill>
+            </a:endParaRPr>
+          </a:p>
+          <a:p>
+            <a:pPr marL="285750" lvl="0" indent="-285750" defTabSz="488950">
               <a:lnSpc>
                 <a:spcPct val="90000"/>
               </a:lnSpc>
@@ -23310,7 +22065,32 @@
                 <a:spcPct val="35000"/>
               </a:spcAft>
               <a:buFont typeface="Arial" panose="020B0604020202020204" pitchFamily="34" charset="0"/>
-              <a:buNone/>
+              <a:buChar char="•"/>
+            </a:pPr>
+            <a:r>
+              <a:rPr lang="en-AU" sz="1400" kern="1200" baseline="0" dirty="0">
+                <a:solidFill>
+                  <a:schemeClr val="accent2">
+                    <a:lumMod val="50000"/>
+                  </a:schemeClr>
+                </a:solidFill>
+              </a:rPr>
+              <a:t>Support Vector Model</a:t>
+            </a:r>
+          </a:p>
+          <a:p>
+            <a:pPr marL="285750" lvl="0" indent="-285750" defTabSz="488950">
+              <a:lnSpc>
+                <a:spcPct val="90000"/>
+              </a:lnSpc>
+              <a:spcBef>
+                <a:spcPct val="0"/>
+              </a:spcBef>
+              <a:spcAft>
+                <a:spcPct val="35000"/>
+              </a:spcAft>
+              <a:buFont typeface="Arial" panose="020B0604020202020204" pitchFamily="34" charset="0"/>
+              <a:buChar char="•"/>
             </a:pPr>
             <a:r>
               <a:rPr lang="en-AU" sz="1400" kern="1200" baseline="0" dirty="0">
@@ -23406,7 +22186,7 @@
         <p:spPr>
           <a:xfrm>
             <a:off x="6945902" y="5342603"/>
-            <a:ext cx="2623792" cy="1264606"/>
+            <a:ext cx="2769598" cy="1264606"/>
           </a:xfrm>
           <a:prstGeom prst="rect">
             <a:avLst/>
@@ -23439,7 +22219,7 @@
           </a:bodyPr>
           <a:lstStyle/>
           <a:p>
-            <a:pPr marL="0" lvl="0" indent="0" defTabSz="488950">
+            <a:pPr marL="285750" lvl="0" indent="-285750" defTabSz="488950">
               <a:lnSpc>
                 <a:spcPct val="90000"/>
               </a:lnSpc>
@@ -23450,7 +22230,7 @@
                 <a:spcPts val="200"/>
               </a:spcAft>
               <a:buFont typeface="Arial" panose="020B0604020202020204" pitchFamily="34" charset="0"/>
-              <a:buNone/>
+              <a:buChar char="•"/>
             </a:pPr>
             <a:r>
               <a:rPr lang="en-AU" sz="1400" kern="1200" baseline="0" dirty="0">
@@ -23464,7 +22244,7 @@
             </a:r>
           </a:p>
           <a:p>
-            <a:pPr marL="0" lvl="0" indent="0" defTabSz="488950">
+            <a:pPr marL="285750" lvl="0" indent="-285750" defTabSz="488950">
               <a:lnSpc>
                 <a:spcPct val="90000"/>
               </a:lnSpc>
@@ -23475,7 +22255,7 @@
                 <a:spcPts val="200"/>
               </a:spcAft>
               <a:buFont typeface="Arial" panose="020B0604020202020204" pitchFamily="34" charset="0"/>
-              <a:buNone/>
+              <a:buChar char="•"/>
             </a:pPr>
             <a:r>
               <a:rPr lang="en-AU" sz="1400" kern="1200" baseline="0" dirty="0">
@@ -23489,7 +22269,7 @@
             </a:r>
           </a:p>
           <a:p>
-            <a:pPr marL="0" lvl="0" indent="0" defTabSz="488950">
+            <a:pPr marL="285750" lvl="0" indent="-285750" defTabSz="488950">
               <a:lnSpc>
                 <a:spcPct val="90000"/>
               </a:lnSpc>
@@ -23500,7 +22280,7 @@
                 <a:spcPts val="200"/>
               </a:spcAft>
               <a:buFont typeface="Arial" panose="020B0604020202020204" pitchFamily="34" charset="0"/>
-              <a:buNone/>
+              <a:buChar char="•"/>
             </a:pPr>
             <a:r>
               <a:rPr lang="en-AU" sz="1400" kern="1200" baseline="0" dirty="0">
@@ -23641,8 +22421,8 @@
         </p:nvSpPr>
         <p:spPr>
           <a:xfrm>
-            <a:off x="3651149" y="5378568"/>
-            <a:ext cx="1919705" cy="1228641"/>
+            <a:off x="3500929" y="5378568"/>
+            <a:ext cx="2069926" cy="1228641"/>
           </a:xfrm>
           <a:prstGeom prst="rect">
             <a:avLst/>
@@ -23673,7 +22453,7 @@
           </a:bodyPr>
           <a:lstStyle/>
           <a:p>
-            <a:pPr marL="0" lvl="0" indent="0" algn="r" defTabSz="488950">
+            <a:pPr marL="285750" lvl="0" indent="-285750" algn="r" defTabSz="488950">
               <a:lnSpc>
                 <a:spcPct val="90000"/>
               </a:lnSpc>
@@ -23684,7 +22464,7 @@
                 <a:spcPct val="35000"/>
               </a:spcAft>
               <a:buFont typeface="Arial" panose="020B0604020202020204" pitchFamily="34" charset="0"/>
-              <a:buNone/>
+              <a:buChar char="•"/>
             </a:pPr>
             <a:r>
               <a:rPr lang="en-AU" sz="1400" kern="1200" baseline="0" dirty="0">
@@ -23698,7 +22478,7 @@
             </a:r>
           </a:p>
           <a:p>
-            <a:pPr marL="0" lvl="0" indent="0" algn="r" defTabSz="488950">
+            <a:pPr marL="285750" lvl="0" indent="-285750" algn="r" defTabSz="488950">
               <a:lnSpc>
                 <a:spcPct val="90000"/>
               </a:lnSpc>
@@ -23709,7 +22489,7 @@
                 <a:spcPct val="35000"/>
               </a:spcAft>
               <a:buFont typeface="Arial" panose="020B0604020202020204" pitchFamily="34" charset="0"/>
-              <a:buNone/>
+              <a:buChar char="•"/>
             </a:pPr>
             <a:r>
               <a:rPr lang="en-AU" sz="1400" kern="1200" baseline="0" dirty="0">
@@ -23723,7 +22503,7 @@
             </a:r>
           </a:p>
           <a:p>
-            <a:pPr marL="0" lvl="0" indent="0" algn="r" defTabSz="488950">
+            <a:pPr marL="285750" lvl="0" indent="-285750" algn="r" defTabSz="488950">
               <a:lnSpc>
                 <a:spcPct val="90000"/>
               </a:lnSpc>
@@ -23734,7 +22514,7 @@
                 <a:spcPct val="35000"/>
               </a:spcAft>
               <a:buFont typeface="Arial" panose="020B0604020202020204" pitchFamily="34" charset="0"/>
-              <a:buNone/>
+              <a:buChar char="•"/>
             </a:pPr>
             <a:r>
               <a:rPr lang="en-AU" sz="1400" kern="1200" baseline="0" dirty="0">
@@ -23762,7 +22542,7 @@
 </p:sld>
 </file>
 
-<file path=ppt/slides/slide9.xml><?xml version="1.0" encoding="utf-8"?>
+<file path=ppt/slides/slide7.xml><?xml version="1.0" encoding="utf-8"?>
 <p:sld xmlns:a="http://schemas.openxmlformats.org/drawingml/2006/main" xmlns:r="http://schemas.openxmlformats.org/officeDocument/2006/relationships" xmlns:p="http://schemas.openxmlformats.org/presentationml/2006/main">
   <p:cSld>
     <p:spTree>
@@ -23794,14 +22574,14 @@
           <p:nvPr>
             <p:extLst>
               <p:ext uri="{D42A27DB-BD31-4B8C-83A1-F6EECF244321}">
-                <p14:modId xmlns:p14="http://schemas.microsoft.com/office/powerpoint/2010/main" val="3895026551"/>
+                <p14:modId xmlns:p14="http://schemas.microsoft.com/office/powerpoint/2010/main" val="2921295316"/>
               </p:ext>
             </p:extLst>
           </p:nvPr>
         </p:nvGraphicFramePr>
         <p:xfrm>
-          <a:off x="2118166" y="1225472"/>
-          <a:ext cx="7569846" cy="4139390"/>
+          <a:off x="1652953" y="1225472"/>
+          <a:ext cx="8457090" cy="4139390"/>
         </p:xfrm>
         <a:graphic>
           <a:graphicData uri="http://schemas.openxmlformats.org/drawingml/2006/table">
@@ -23810,42 +22590,42 @@
                 <a:tableStyleId>{5C22544A-7EE6-4342-B048-85BDC9FD1C3A}</a:tableStyleId>
               </a:tblPr>
               <a:tblGrid>
-                <a:gridCol w="1261641">
+                <a:gridCol w="1409515">
                   <a:extLst>
                     <a:ext uri="{9D8B030D-6E8A-4147-A177-3AD203B41FA5}">
                       <a16:colId xmlns:a16="http://schemas.microsoft.com/office/drawing/2014/main" val="3102286299"/>
                     </a:ext>
                   </a:extLst>
                 </a:gridCol>
-                <a:gridCol w="1261641">
+                <a:gridCol w="1409515">
                   <a:extLst>
                     <a:ext uri="{9D8B030D-6E8A-4147-A177-3AD203B41FA5}">
                       <a16:colId xmlns:a16="http://schemas.microsoft.com/office/drawing/2014/main" val="852225984"/>
                     </a:ext>
                   </a:extLst>
                 </a:gridCol>
-                <a:gridCol w="1261641">
+                <a:gridCol w="1409515">
                   <a:extLst>
                     <a:ext uri="{9D8B030D-6E8A-4147-A177-3AD203B41FA5}">
                       <a16:colId xmlns:a16="http://schemas.microsoft.com/office/drawing/2014/main" val="1156486878"/>
                     </a:ext>
                   </a:extLst>
                 </a:gridCol>
-                <a:gridCol w="1261641">
+                <a:gridCol w="1409515">
                   <a:extLst>
                     <a:ext uri="{9D8B030D-6E8A-4147-A177-3AD203B41FA5}">
                       <a16:colId xmlns:a16="http://schemas.microsoft.com/office/drawing/2014/main" val="3197284154"/>
                     </a:ext>
                   </a:extLst>
                 </a:gridCol>
-                <a:gridCol w="1261641">
+                <a:gridCol w="1409515">
                   <a:extLst>
                     <a:ext uri="{9D8B030D-6E8A-4147-A177-3AD203B41FA5}">
                       <a16:colId xmlns:a16="http://schemas.microsoft.com/office/drawing/2014/main" val="453940589"/>
                     </a:ext>
                   </a:extLst>
                 </a:gridCol>
-                <a:gridCol w="1261641">
+                <a:gridCol w="1409515">
                   <a:extLst>
                     <a:ext uri="{9D8B030D-6E8A-4147-A177-3AD203B41FA5}">
                       <a16:colId xmlns:a16="http://schemas.microsoft.com/office/drawing/2014/main" val="151999660"/>
@@ -24345,8 +23125,8 @@
         </p:nvSpPr>
         <p:spPr>
           <a:xfrm>
-            <a:off x="3401648" y="5454891"/>
-            <a:ext cx="1243524" cy="892552"/>
+            <a:off x="3117139" y="5449759"/>
+            <a:ext cx="1312896" cy="892552"/>
           </a:xfrm>
           <a:prstGeom prst="rect">
             <a:avLst/>
@@ -24422,8 +23202,8 @@
         </p:nvSpPr>
         <p:spPr>
           <a:xfrm>
-            <a:off x="4685130" y="5454891"/>
-            <a:ext cx="1243524" cy="892552"/>
+            <a:off x="4537344" y="5449759"/>
+            <a:ext cx="1312896" cy="892552"/>
           </a:xfrm>
           <a:prstGeom prst="rect">
             <a:avLst/>
@@ -24478,8 +23258,8 @@
         </p:nvSpPr>
         <p:spPr>
           <a:xfrm>
-            <a:off x="5968612" y="5454891"/>
-            <a:ext cx="1243524" cy="892552"/>
+            <a:off x="5933535" y="5449759"/>
+            <a:ext cx="1312896" cy="892552"/>
           </a:xfrm>
           <a:prstGeom prst="rect">
             <a:avLst/>
@@ -24534,8 +23314,8 @@
         </p:nvSpPr>
         <p:spPr>
           <a:xfrm>
-            <a:off x="7252094" y="5454891"/>
-            <a:ext cx="1197980" cy="892552"/>
+            <a:off x="7360947" y="5449759"/>
+            <a:ext cx="1312898" cy="892552"/>
           </a:xfrm>
           <a:prstGeom prst="rect">
             <a:avLst/>
@@ -24590,8 +23370,8 @@
         </p:nvSpPr>
         <p:spPr>
           <a:xfrm>
-            <a:off x="8490031" y="5454891"/>
-            <a:ext cx="1197981" cy="892552"/>
+            <a:off x="8788359" y="5449759"/>
+            <a:ext cx="1312898" cy="892552"/>
           </a:xfrm>
           <a:prstGeom prst="rect">
             <a:avLst/>
@@ -24646,8 +23426,8 @@
         </p:nvSpPr>
         <p:spPr>
           <a:xfrm>
-            <a:off x="2118166" y="5454891"/>
-            <a:ext cx="1243524" cy="892552"/>
+            <a:off x="1652953" y="5449759"/>
+            <a:ext cx="1354515" cy="892552"/>
           </a:xfrm>
           <a:prstGeom prst="rect">
             <a:avLst/>
@@ -24762,6 +23542,793 @@
     <p:extLst>
       <p:ext uri="{BB962C8B-B14F-4D97-AF65-F5344CB8AC3E}">
         <p14:creationId xmlns:p14="http://schemas.microsoft.com/office/powerpoint/2010/main" val="1777382479"/>
+      </p:ext>
+    </p:extLst>
+  </p:cSld>
+  <p:clrMapOvr>
+    <a:masterClrMapping/>
+  </p:clrMapOvr>
+</p:sld>
+</file>
+
+<file path=ppt/slides/slide8.xml><?xml version="1.0" encoding="utf-8"?>
+<p:sld xmlns:a="http://schemas.openxmlformats.org/drawingml/2006/main" xmlns:r="http://schemas.openxmlformats.org/officeDocument/2006/relationships" xmlns:p="http://schemas.openxmlformats.org/presentationml/2006/main">
+  <p:cSld>
+    <p:spTree>
+      <p:nvGrpSpPr>
+        <p:cNvPr id="1" name=""/>
+        <p:cNvGrpSpPr/>
+        <p:nvPr/>
+      </p:nvGrpSpPr>
+      <p:grpSpPr>
+        <a:xfrm>
+          <a:off x="0" y="0"/>
+          <a:ext cx="0" cy="0"/>
+          <a:chOff x="0" y="0"/>
+          <a:chExt cx="0" cy="0"/>
+        </a:xfrm>
+      </p:grpSpPr>
+      <p:sp>
+        <p:nvSpPr>
+          <p:cNvPr id="13" name="Title 1">
+            <a:extLst>
+              <a:ext uri="{FF2B5EF4-FFF2-40B4-BE49-F238E27FC236}">
+                <a16:creationId xmlns:a16="http://schemas.microsoft.com/office/drawing/2014/main" id="{A2794723-E065-BC39-2647-89E04F0EC9CF}"/>
+              </a:ext>
+            </a:extLst>
+          </p:cNvPr>
+          <p:cNvSpPr txBox="1">
+            <a:spLocks/>
+          </p:cNvSpPr>
+          <p:nvPr/>
+        </p:nvSpPr>
+        <p:spPr>
+          <a:xfrm>
+            <a:off x="0" y="-8876"/>
+            <a:ext cx="12191999" cy="963580"/>
+          </a:xfrm>
+          <a:prstGeom prst="rect">
+            <a:avLst/>
+          </a:prstGeom>
+          <a:solidFill>
+            <a:schemeClr val="tx1"/>
+          </a:solidFill>
+        </p:spPr>
+        <p:txBody>
+          <a:bodyPr anchor="b"/>
+          <a:lstStyle>
+            <a:lvl1pPr algn="l" defTabSz="914400" rtl="0" eaLnBrk="1" latinLnBrk="0" hangingPunct="1">
+              <a:lnSpc>
+                <a:spcPct val="90000"/>
+              </a:lnSpc>
+              <a:spcBef>
+                <a:spcPct val="0"/>
+              </a:spcBef>
+              <a:buNone/>
+              <a:defRPr sz="4400" kern="1200">
+                <a:solidFill>
+                  <a:schemeClr val="tx1"/>
+                </a:solidFill>
+                <a:latin typeface="+mj-lt"/>
+                <a:ea typeface="+mj-ea"/>
+                <a:cs typeface="+mj-cs"/>
+              </a:defRPr>
+            </a:lvl1pPr>
+          </a:lstStyle>
+          <a:p>
+            <a:r>
+              <a:rPr lang="en-AU" dirty="0">
+                <a:solidFill>
+                  <a:schemeClr val="bg1"/>
+                </a:solidFill>
+                <a:latin typeface="Posterama" panose="020B0504020200020000" pitchFamily="34" charset="0"/>
+                <a:cs typeface="Posterama" panose="020B0504020200020000" pitchFamily="34" charset="0"/>
+              </a:rPr>
+              <a:t>Warts and All</a:t>
+            </a:r>
+          </a:p>
+        </p:txBody>
+      </p:sp>
+      <p:pic>
+        <p:nvPicPr>
+          <p:cNvPr id="14" name="Picture 10" descr="Streamlit logo on light background">
+            <a:hlinkClick r:id="rId3"/>
+            <a:extLst>
+              <a:ext uri="{FF2B5EF4-FFF2-40B4-BE49-F238E27FC236}">
+                <a16:creationId xmlns:a16="http://schemas.microsoft.com/office/drawing/2014/main" id="{BBD83F7D-06E2-82DB-76F6-441F12ABE858}"/>
+              </a:ext>
+            </a:extLst>
+          </p:cNvPr>
+          <p:cNvPicPr>
+            <a:picLocks noChangeAspect="1" noChangeArrowheads="1"/>
+          </p:cNvPicPr>
+          <p:nvPr/>
+        </p:nvPicPr>
+        <p:blipFill>
+          <a:blip r:embed="rId4">
+            <a:extLst>
+              <a:ext uri="{28A0092B-C50C-407E-A947-70E740481C1C}">
+                <a14:useLocalDpi xmlns:a14="http://schemas.microsoft.com/office/drawing/2010/main" val="0"/>
+              </a:ext>
+            </a:extLst>
+          </a:blip>
+          <a:srcRect/>
+          <a:stretch>
+            <a:fillRect/>
+          </a:stretch>
+        </p:blipFill>
+        <p:spPr bwMode="auto">
+          <a:xfrm>
+            <a:off x="9018657" y="866213"/>
+            <a:ext cx="3259087" cy="904737"/>
+          </a:xfrm>
+          <a:prstGeom prst="rect">
+            <a:avLst/>
+          </a:prstGeom>
+          <a:noFill/>
+          <a:extLst>
+            <a:ext uri="{909E8E84-426E-40DD-AFC4-6F175D3DCCD1}">
+              <a14:hiddenFill xmlns:a14="http://schemas.microsoft.com/office/drawing/2010/main">
+                <a:solidFill>
+                  <a:srgbClr val="FFFFFF"/>
+                </a:solidFill>
+              </a14:hiddenFill>
+            </a:ext>
+          </a:extLst>
+        </p:spPr>
+      </p:pic>
+      <p:sp>
+        <p:nvSpPr>
+          <p:cNvPr id="4" name="TextBox 3">
+            <a:extLst>
+              <a:ext uri="{FF2B5EF4-FFF2-40B4-BE49-F238E27FC236}">
+                <a16:creationId xmlns:a16="http://schemas.microsoft.com/office/drawing/2014/main" id="{C612C28F-07DC-CD86-F5A9-8FED2AEDA360}"/>
+              </a:ext>
+            </a:extLst>
+          </p:cNvPr>
+          <p:cNvSpPr txBox="1"/>
+          <p:nvPr/>
+        </p:nvSpPr>
+        <p:spPr>
+          <a:xfrm>
+            <a:off x="330653" y="1737153"/>
+            <a:ext cx="11311617" cy="307777"/>
+          </a:xfrm>
+          <a:prstGeom prst="rect">
+            <a:avLst/>
+          </a:prstGeom>
+          <a:noFill/>
+        </p:spPr>
+        <p:txBody>
+          <a:bodyPr wrap="square">
+            <a:spAutoFit/>
+          </a:bodyPr>
+          <a:lstStyle/>
+          <a:p>
+            <a:r>
+              <a:rPr lang="en-US" sz="1400" b="1" dirty="0"/>
+              <a:t>Title:</a:t>
+            </a:r>
+            <a:r>
+              <a:rPr lang="en-US" sz="1400" dirty="0"/>
+              <a:t> Endangered </a:t>
+            </a:r>
+            <a:r>
+              <a:rPr lang="en-US" sz="1400" dirty="0">
+                <a:solidFill>
+                  <a:schemeClr val="tx2">
+                    <a:lumMod val="50000"/>
+                    <a:lumOff val="50000"/>
+                  </a:schemeClr>
+                </a:solidFill>
+              </a:rPr>
+              <a:t>Rabbit</a:t>
+            </a:r>
+            <a:r>
+              <a:rPr lang="en-US" sz="1400" dirty="0"/>
+              <a:t> Species Successfully Bred in Captivity at </a:t>
+            </a:r>
+            <a:r>
+              <a:rPr lang="en-US" sz="1400" dirty="0" err="1">
+                <a:solidFill>
+                  <a:schemeClr val="accent5">
+                    <a:lumMod val="60000"/>
+                    <a:lumOff val="40000"/>
+                  </a:schemeClr>
+                </a:solidFill>
+              </a:rPr>
+              <a:t>Sawubona</a:t>
+            </a:r>
+            <a:r>
+              <a:rPr lang="en-US" sz="1400" dirty="0">
+                <a:solidFill>
+                  <a:schemeClr val="accent5">
+                    <a:lumMod val="60000"/>
+                    <a:lumOff val="40000"/>
+                  </a:schemeClr>
+                </a:solidFill>
+              </a:rPr>
+              <a:t> Zoo</a:t>
+            </a:r>
+            <a:r>
+              <a:rPr lang="en-US" sz="1400" dirty="0"/>
+              <a:t>, South Africa</a:t>
+            </a:r>
+          </a:p>
+        </p:txBody>
+      </p:sp>
+      <p:cxnSp>
+        <p:nvCxnSpPr>
+          <p:cNvPr id="6" name="Straight Connector 5">
+            <a:extLst>
+              <a:ext uri="{FF2B5EF4-FFF2-40B4-BE49-F238E27FC236}">
+                <a16:creationId xmlns:a16="http://schemas.microsoft.com/office/drawing/2014/main" id="{E5FC21C3-833B-537B-CE14-B10DEF4632EF}"/>
+              </a:ext>
+            </a:extLst>
+          </p:cNvPr>
+          <p:cNvCxnSpPr/>
+          <p:nvPr/>
+        </p:nvCxnSpPr>
+        <p:spPr>
+          <a:xfrm>
+            <a:off x="330653" y="1608576"/>
+            <a:ext cx="11548383" cy="0"/>
+          </a:xfrm>
+          <a:prstGeom prst="line">
+            <a:avLst/>
+          </a:prstGeom>
+          <a:ln w="28575">
+            <a:solidFill>
+              <a:schemeClr val="bg1">
+                <a:lumMod val="75000"/>
+              </a:schemeClr>
+            </a:solidFill>
+          </a:ln>
+        </p:spPr>
+        <p:style>
+          <a:lnRef idx="2">
+            <a:schemeClr val="accent1"/>
+          </a:lnRef>
+          <a:fillRef idx="0">
+            <a:schemeClr val="accent1"/>
+          </a:fillRef>
+          <a:effectRef idx="1">
+            <a:schemeClr val="accent1"/>
+          </a:effectRef>
+          <a:fontRef idx="minor">
+            <a:schemeClr val="tx1"/>
+          </a:fontRef>
+        </p:style>
+      </p:cxnSp>
+      <p:cxnSp>
+        <p:nvCxnSpPr>
+          <p:cNvPr id="7" name="Straight Connector 6">
+            <a:extLst>
+              <a:ext uri="{FF2B5EF4-FFF2-40B4-BE49-F238E27FC236}">
+                <a16:creationId xmlns:a16="http://schemas.microsoft.com/office/drawing/2014/main" id="{386ECB88-AB53-0E64-8907-BED34FC452EC}"/>
+              </a:ext>
+            </a:extLst>
+          </p:cNvPr>
+          <p:cNvCxnSpPr/>
+          <p:nvPr/>
+        </p:nvCxnSpPr>
+        <p:spPr>
+          <a:xfrm>
+            <a:off x="330653" y="2152865"/>
+            <a:ext cx="11548383" cy="0"/>
+          </a:xfrm>
+          <a:prstGeom prst="line">
+            <a:avLst/>
+          </a:prstGeom>
+          <a:ln w="28575">
+            <a:solidFill>
+              <a:schemeClr val="bg1">
+                <a:lumMod val="75000"/>
+              </a:schemeClr>
+            </a:solidFill>
+          </a:ln>
+        </p:spPr>
+        <p:style>
+          <a:lnRef idx="2">
+            <a:schemeClr val="accent1"/>
+          </a:lnRef>
+          <a:fillRef idx="0">
+            <a:schemeClr val="accent1"/>
+          </a:fillRef>
+          <a:effectRef idx="1">
+            <a:schemeClr val="accent1"/>
+          </a:effectRef>
+          <a:fontRef idx="minor">
+            <a:schemeClr val="tx1"/>
+          </a:fontRef>
+        </p:style>
+      </p:cxnSp>
+      <p:sp>
+        <p:nvSpPr>
+          <p:cNvPr id="9" name="TextBox 8">
+            <a:extLst>
+              <a:ext uri="{FF2B5EF4-FFF2-40B4-BE49-F238E27FC236}">
+                <a16:creationId xmlns:a16="http://schemas.microsoft.com/office/drawing/2014/main" id="{2CF60653-D840-3EC4-0731-C1A32FBD4C73}"/>
+              </a:ext>
+            </a:extLst>
+          </p:cNvPr>
+          <p:cNvSpPr txBox="1"/>
+          <p:nvPr/>
+        </p:nvSpPr>
+        <p:spPr>
+          <a:xfrm>
+            <a:off x="330653" y="2254074"/>
+            <a:ext cx="11678467" cy="4401205"/>
+          </a:xfrm>
+          <a:prstGeom prst="rect">
+            <a:avLst/>
+          </a:prstGeom>
+          <a:noFill/>
+        </p:spPr>
+        <p:txBody>
+          <a:bodyPr wrap="square">
+            <a:spAutoFit/>
+          </a:bodyPr>
+          <a:lstStyle/>
+          <a:p>
+            <a:r>
+              <a:rPr lang="en-US" sz="1400" b="1" dirty="0"/>
+              <a:t>Article Text:</a:t>
+            </a:r>
+            <a:endParaRPr lang="en-US" sz="1400" dirty="0"/>
+          </a:p>
+          <a:p>
+            <a:r>
+              <a:rPr lang="en-US" sz="1400" dirty="0"/>
+              <a:t>In a </a:t>
+            </a:r>
+            <a:r>
+              <a:rPr lang="en-US" sz="1400" dirty="0">
+                <a:solidFill>
+                  <a:schemeClr val="tx2">
+                    <a:lumMod val="50000"/>
+                    <a:lumOff val="50000"/>
+                  </a:schemeClr>
+                </a:solidFill>
+              </a:rPr>
+              <a:t>monumental achievement </a:t>
+            </a:r>
+            <a:r>
+              <a:rPr lang="en-US" sz="1400" dirty="0"/>
+              <a:t>for wildlife conservation, </a:t>
+            </a:r>
+            <a:r>
+              <a:rPr lang="en-US" sz="1400" dirty="0" err="1"/>
+              <a:t>Sawubona</a:t>
+            </a:r>
+            <a:r>
+              <a:rPr lang="en-US" sz="1400" dirty="0"/>
+              <a:t> Zoo in </a:t>
+            </a:r>
+            <a:r>
+              <a:rPr lang="en-US" sz="1400" dirty="0">
+                <a:solidFill>
+                  <a:schemeClr val="accent2">
+                    <a:lumMod val="75000"/>
+                  </a:schemeClr>
+                </a:solidFill>
+              </a:rPr>
+              <a:t>Port Shepstone</a:t>
+            </a:r>
+            <a:r>
+              <a:rPr lang="en-US" sz="1400" dirty="0"/>
+              <a:t>, South Africa, has successfully bred an endangered rabbit </a:t>
+            </a:r>
+            <a:r>
+              <a:rPr lang="en-US" sz="1400" dirty="0">
+                <a:solidFill>
+                  <a:schemeClr val="tx2">
+                    <a:lumMod val="50000"/>
+                    <a:lumOff val="50000"/>
+                  </a:schemeClr>
+                </a:solidFill>
+              </a:rPr>
+              <a:t>species</a:t>
+            </a:r>
+            <a:r>
+              <a:rPr lang="en-US" sz="1400" dirty="0"/>
+              <a:t> in captivity. This marks a significant breakthrough in efforts to conserve and protect the species, which has faced declining populations in the wild.</a:t>
+            </a:r>
+          </a:p>
+          <a:p>
+            <a:endParaRPr lang="en-US" sz="1400" dirty="0"/>
+          </a:p>
+          <a:p>
+            <a:pPr algn="just"/>
+            <a:r>
+              <a:rPr lang="en-US" sz="1400" dirty="0"/>
+              <a:t>The birth took place under the expert supervision of Thandeka Ndlovu, the Chief Zookeeper at </a:t>
+            </a:r>
+            <a:r>
+              <a:rPr lang="en-US" sz="1400" dirty="0" err="1"/>
+              <a:t>Sawubona</a:t>
+            </a:r>
+            <a:r>
+              <a:rPr lang="en-US" sz="1400" dirty="0"/>
+              <a:t> Zoo, who has led the conservation project for over a decade. "This is a milestone in our efforts to save this species from extinction," Ndlovu said. "Breeding rabbits in captivity has always been a challenge, but our team’s dedication and </a:t>
+            </a:r>
+            <a:r>
+              <a:rPr lang="en-US" sz="1400" dirty="0">
+                <a:solidFill>
+                  <a:schemeClr val="accent5">
+                    <a:lumMod val="60000"/>
+                    <a:lumOff val="40000"/>
+                  </a:schemeClr>
+                </a:solidFill>
+              </a:rPr>
+              <a:t>innovative techniques</a:t>
+            </a:r>
+            <a:r>
+              <a:rPr lang="en-US" sz="1400" dirty="0"/>
+              <a:t> have made this success possible.“</a:t>
+            </a:r>
+          </a:p>
+          <a:p>
+            <a:pPr algn="just"/>
+            <a:endParaRPr lang="en-US" sz="1400" dirty="0"/>
+          </a:p>
+          <a:p>
+            <a:r>
+              <a:rPr lang="en-US" sz="1400" dirty="0"/>
+              <a:t>The newborn rabbit, a member of a critically endangered species, is in excellent health and is already becoming accustomed to its new environment. The team at </a:t>
+            </a:r>
+            <a:r>
+              <a:rPr lang="en-US" sz="1400" dirty="0" err="1"/>
+              <a:t>Sawubona</a:t>
+            </a:r>
+            <a:r>
+              <a:rPr lang="en-US" sz="1400" dirty="0"/>
+              <a:t> Zoo has been working tirelessly to create conditions that mimic the rabbit's natural habitat, ensuring that the mother and her offspring are comfortable and secure.</a:t>
+            </a:r>
+          </a:p>
+          <a:p>
+            <a:endParaRPr lang="en-US" sz="1400" dirty="0"/>
+          </a:p>
+          <a:p>
+            <a:r>
+              <a:rPr lang="en-US" sz="1400" dirty="0"/>
+              <a:t>"We’ve been studying the behavioral patterns and needs of these rabbits for years, and this birth is the culmination of our hard work," Ndlovu explained. "This success gives us hope for the future of this species, and we’re excited to see what comes next.“ The zoo plans to continue its breeding program, with the hope of eventually reintroducing these rabbits into their natural habitats. </a:t>
+            </a:r>
+            <a:r>
+              <a:rPr lang="en-US" sz="1400" dirty="0" err="1"/>
+              <a:t>Sawubona</a:t>
+            </a:r>
+            <a:r>
+              <a:rPr lang="en-US" sz="1400" dirty="0"/>
+              <a:t> Zoo is inviting the public to learn more about the conservation efforts and to witness this rare and special event firsthand.</a:t>
+            </a:r>
+          </a:p>
+          <a:p>
+            <a:endParaRPr lang="en-US" sz="1400" dirty="0"/>
+          </a:p>
+          <a:p>
+            <a:r>
+              <a:rPr lang="en-US" sz="1400" dirty="0"/>
+              <a:t>The successful breeding at </a:t>
+            </a:r>
+            <a:r>
+              <a:rPr lang="en-US" sz="1400" dirty="0" err="1"/>
+              <a:t>Sawubona</a:t>
+            </a:r>
+            <a:r>
+              <a:rPr lang="en-US" sz="1400" dirty="0"/>
+              <a:t> Zoo is being hailed as a major step forward in the fight to protect endangered species. Thandeka Ndlovu and her team are committed to continuing their work to ensure that future generations will be able to witness these incredible animals in the wild.</a:t>
+            </a:r>
+          </a:p>
+        </p:txBody>
+      </p:sp>
+    </p:spTree>
+    <p:extLst>
+      <p:ext uri="{BB962C8B-B14F-4D97-AF65-F5344CB8AC3E}">
+        <p14:creationId xmlns:p14="http://schemas.microsoft.com/office/powerpoint/2010/main" val="1749171866"/>
+      </p:ext>
+    </p:extLst>
+  </p:cSld>
+  <p:clrMapOvr>
+    <a:masterClrMapping/>
+  </p:clrMapOvr>
+</p:sld>
+</file>
+
+<file path=ppt/slides/slide9.xml><?xml version="1.0" encoding="utf-8"?>
+<p:sld xmlns:a="http://schemas.openxmlformats.org/drawingml/2006/main" xmlns:r="http://schemas.openxmlformats.org/officeDocument/2006/relationships" xmlns:p="http://schemas.openxmlformats.org/presentationml/2006/main">
+  <p:cSld>
+    <p:spTree>
+      <p:nvGrpSpPr>
+        <p:cNvPr id="1" name=""/>
+        <p:cNvGrpSpPr/>
+        <p:nvPr/>
+      </p:nvGrpSpPr>
+      <p:grpSpPr>
+        <a:xfrm>
+          <a:off x="0" y="0"/>
+          <a:ext cx="0" cy="0"/>
+          <a:chOff x="0" y="0"/>
+          <a:chExt cx="0" cy="0"/>
+        </a:xfrm>
+      </p:grpSpPr>
+      <p:graphicFrame>
+        <p:nvGraphicFramePr>
+          <p:cNvPr id="7" name="think-cell data - do not delete" hidden="1">
+            <a:extLst>
+              <a:ext uri="{FF2B5EF4-FFF2-40B4-BE49-F238E27FC236}">
+                <a16:creationId xmlns:a16="http://schemas.microsoft.com/office/drawing/2014/main" id="{8920D5D8-F268-B530-4CA7-371DFB5553A6}"/>
+              </a:ext>
+            </a:extLst>
+          </p:cNvPr>
+          <p:cNvGraphicFramePr>
+            <a:graphicFrameLocks noChangeAspect="1"/>
+          </p:cNvGraphicFramePr>
+          <p:nvPr>
+            <p:custDataLst>
+              <p:tags r:id="rId1"/>
+            </p:custDataLst>
+            <p:extLst>
+              <p:ext uri="{D42A27DB-BD31-4B8C-83A1-F6EECF244321}">
+                <p14:modId xmlns:p14="http://schemas.microsoft.com/office/powerpoint/2010/main" val="4117187764"/>
+              </p:ext>
+            </p:extLst>
+          </p:nvPr>
+        </p:nvGraphicFramePr>
+        <p:xfrm>
+          <a:off x="1588" y="1588"/>
+          <a:ext cx="1588" cy="1588"/>
+        </p:xfrm>
+        <a:graphic>
+          <a:graphicData uri="http://schemas.openxmlformats.org/presentationml/2006/ole">
+            <mc:AlternateContent xmlns:mc="http://schemas.openxmlformats.org/markup-compatibility/2006">
+              <mc:Choice xmlns:v="urn:schemas-microsoft-com:vml" Requires="v">
+                <p:oleObj name="think-cell Slide" r:id="rId4" imgW="392" imgH="392" progId="TCLayout.ActiveDocument.1">
+                  <p:embed/>
+                </p:oleObj>
+              </mc:Choice>
+              <mc:Fallback>
+                <p:oleObj name="think-cell Slide" r:id="rId4" imgW="392" imgH="392" progId="TCLayout.ActiveDocument.1">
+                  <p:embed/>
+                  <p:pic>
+                    <p:nvPicPr>
+                      <p:cNvPr id="0" name=""/>
+                      <p:cNvPicPr/>
+                      <p:nvPr/>
+                    </p:nvPicPr>
+                    <p:blipFill>
+                      <a:blip r:embed="rId5"/>
+                      <a:stretch>
+                        <a:fillRect/>
+                      </a:stretch>
+                    </p:blipFill>
+                    <p:spPr>
+                      <a:xfrm>
+                        <a:off x="1588" y="1588"/>
+                        <a:ext cx="1588" cy="1588"/>
+                      </a:xfrm>
+                      <a:prstGeom prst="rect">
+                        <a:avLst/>
+                      </a:prstGeom>
+                    </p:spPr>
+                  </p:pic>
+                </p:oleObj>
+              </mc:Fallback>
+            </mc:AlternateContent>
+          </a:graphicData>
+        </a:graphic>
+      </p:graphicFrame>
+      <p:pic>
+        <p:nvPicPr>
+          <p:cNvPr id="5" name="Graphic 4" descr="Magnifying glass with solid fill">
+            <a:extLst>
+              <a:ext uri="{FF2B5EF4-FFF2-40B4-BE49-F238E27FC236}">
+                <a16:creationId xmlns:a16="http://schemas.microsoft.com/office/drawing/2014/main" id="{00ACA858-C885-EF74-F6B8-0896FFA318C1}"/>
+              </a:ext>
+            </a:extLst>
+          </p:cNvPr>
+          <p:cNvPicPr>
+            <a:picLocks noChangeAspect="1"/>
+          </p:cNvPicPr>
+          <p:nvPr/>
+        </p:nvPicPr>
+        <p:blipFill>
+          <a:blip r:embed="rId6">
+            <a:extLst>
+              <a:ext uri="{96DAC541-7B7A-43D3-8B79-37D633B846F1}">
+                <asvg:svgBlip xmlns:asvg="http://schemas.microsoft.com/office/drawing/2016/SVG/main" r:embed="rId7"/>
+              </a:ext>
+            </a:extLst>
+          </a:blip>
+          <a:stretch>
+            <a:fillRect/>
+          </a:stretch>
+        </p:blipFill>
+        <p:spPr>
+          <a:xfrm>
+            <a:off x="10514028" y="279431"/>
+            <a:ext cx="1469088" cy="1469088"/>
+          </a:xfrm>
+          <a:prstGeom prst="rect">
+            <a:avLst/>
+          </a:prstGeom>
+        </p:spPr>
+      </p:pic>
+      <p:sp>
+        <p:nvSpPr>
+          <p:cNvPr id="13" name="Title 1">
+            <a:extLst>
+              <a:ext uri="{FF2B5EF4-FFF2-40B4-BE49-F238E27FC236}">
+                <a16:creationId xmlns:a16="http://schemas.microsoft.com/office/drawing/2014/main" id="{A2794723-E065-BC39-2647-89E04F0EC9CF}"/>
+              </a:ext>
+            </a:extLst>
+          </p:cNvPr>
+          <p:cNvSpPr txBox="1">
+            <a:spLocks/>
+          </p:cNvSpPr>
+          <p:nvPr/>
+        </p:nvSpPr>
+        <p:spPr>
+          <a:xfrm>
+            <a:off x="0" y="-8876"/>
+            <a:ext cx="12191999" cy="963580"/>
+          </a:xfrm>
+          <a:prstGeom prst="rect">
+            <a:avLst/>
+          </a:prstGeom>
+          <a:solidFill>
+            <a:schemeClr val="tx1"/>
+          </a:solidFill>
+        </p:spPr>
+        <p:txBody>
+          <a:bodyPr anchor="b"/>
+          <a:lstStyle>
+            <a:lvl1pPr algn="l" defTabSz="914400" rtl="0" eaLnBrk="1" latinLnBrk="0" hangingPunct="1">
+              <a:lnSpc>
+                <a:spcPct val="90000"/>
+              </a:lnSpc>
+              <a:spcBef>
+                <a:spcPct val="0"/>
+              </a:spcBef>
+              <a:buNone/>
+              <a:defRPr sz="4400" kern="1200">
+                <a:solidFill>
+                  <a:schemeClr val="tx1"/>
+                </a:solidFill>
+                <a:latin typeface="+mj-lt"/>
+                <a:ea typeface="+mj-ea"/>
+                <a:cs typeface="+mj-cs"/>
+              </a:defRPr>
+            </a:lvl1pPr>
+          </a:lstStyle>
+          <a:p>
+            <a:r>
+              <a:rPr lang="en-AU" dirty="0">
+                <a:solidFill>
+                  <a:schemeClr val="bg1"/>
+                </a:solidFill>
+                <a:latin typeface="Posterama" panose="020B0504020200020000" pitchFamily="34" charset="0"/>
+                <a:cs typeface="Posterama" panose="020B0504020200020000" pitchFamily="34" charset="0"/>
+              </a:rPr>
+              <a:t>Let’s do some sleuthing…</a:t>
+            </a:r>
+          </a:p>
+        </p:txBody>
+      </p:sp>
+      <p:pic>
+        <p:nvPicPr>
+          <p:cNvPr id="6" name="Picture 5">
+            <a:extLst>
+              <a:ext uri="{FF2B5EF4-FFF2-40B4-BE49-F238E27FC236}">
+                <a16:creationId xmlns:a16="http://schemas.microsoft.com/office/drawing/2014/main" id="{3A0AD45B-024B-7EA4-525A-1555DB2940BB}"/>
+              </a:ext>
+            </a:extLst>
+          </p:cNvPr>
+          <p:cNvPicPr>
+            <a:picLocks noChangeAspect="1"/>
+          </p:cNvPicPr>
+          <p:nvPr/>
+        </p:nvPicPr>
+        <p:blipFill rotWithShape="1">
+          <a:blip r:embed="rId8"/>
+          <a:srcRect l="753" r="53071"/>
+          <a:stretch/>
+        </p:blipFill>
+        <p:spPr>
+          <a:xfrm>
+            <a:off x="47159" y="1699892"/>
+            <a:ext cx="6142404" cy="3618676"/>
+          </a:xfrm>
+          <a:prstGeom prst="rect">
+            <a:avLst/>
+          </a:prstGeom>
+        </p:spPr>
+      </p:pic>
+      <p:pic>
+        <p:nvPicPr>
+          <p:cNvPr id="2" name="Picture 1">
+            <a:extLst>
+              <a:ext uri="{FF2B5EF4-FFF2-40B4-BE49-F238E27FC236}">
+                <a16:creationId xmlns:a16="http://schemas.microsoft.com/office/drawing/2014/main" id="{60302D96-A22F-0177-B1CE-4A992A439DB4}"/>
+              </a:ext>
+            </a:extLst>
+          </p:cNvPr>
+          <p:cNvPicPr>
+            <a:picLocks noChangeAspect="1"/>
+          </p:cNvPicPr>
+          <p:nvPr/>
+        </p:nvPicPr>
+        <p:blipFill rotWithShape="1">
+          <a:blip r:embed="rId8"/>
+          <a:srcRect l="53823"/>
+          <a:stretch/>
+        </p:blipFill>
+        <p:spPr>
+          <a:xfrm>
+            <a:off x="6069186" y="1655426"/>
+            <a:ext cx="6142404" cy="3618676"/>
+          </a:xfrm>
+          <a:prstGeom prst="rect">
+            <a:avLst/>
+          </a:prstGeom>
+        </p:spPr>
+      </p:pic>
+      <p:sp>
+        <p:nvSpPr>
+          <p:cNvPr id="8" name="Oval 7">
+            <a:extLst>
+              <a:ext uri="{FF2B5EF4-FFF2-40B4-BE49-F238E27FC236}">
+                <a16:creationId xmlns:a16="http://schemas.microsoft.com/office/drawing/2014/main" id="{E3AD0EF1-D4F7-73CD-66FE-391EC0DA5B3C}"/>
+              </a:ext>
+            </a:extLst>
+          </p:cNvPr>
+          <p:cNvSpPr/>
+          <p:nvPr/>
+        </p:nvSpPr>
+        <p:spPr>
+          <a:xfrm>
+            <a:off x="10637520" y="411292"/>
+            <a:ext cx="929166" cy="945067"/>
+          </a:xfrm>
+          <a:prstGeom prst="ellipse">
+            <a:avLst/>
+          </a:prstGeom>
+          <a:noFill/>
+          <a:ln>
+            <a:solidFill>
+              <a:schemeClr val="bg1"/>
+            </a:solidFill>
+          </a:ln>
+        </p:spPr>
+        <p:style>
+          <a:lnRef idx="2">
+            <a:schemeClr val="accent1">
+              <a:shade val="15000"/>
+            </a:schemeClr>
+          </a:lnRef>
+          <a:fillRef idx="1">
+            <a:schemeClr val="accent1"/>
+          </a:fillRef>
+          <a:effectRef idx="0">
+            <a:schemeClr val="accent1"/>
+          </a:effectRef>
+          <a:fontRef idx="minor">
+            <a:schemeClr val="lt1"/>
+          </a:fontRef>
+        </p:style>
+        <p:txBody>
+          <a:bodyPr rtlCol="0" anchor="ctr"/>
+          <a:lstStyle/>
+          <a:p>
+            <a:pPr algn="ctr"/>
+            <a:endParaRPr lang="en-US"/>
+          </a:p>
+        </p:txBody>
+      </p:sp>
+    </p:spTree>
+    <p:extLst>
+      <p:ext uri="{BB962C8B-B14F-4D97-AF65-F5344CB8AC3E}">
+        <p14:creationId xmlns:p14="http://schemas.microsoft.com/office/powerpoint/2010/main" val="153390708"/>
       </p:ext>
     </p:extLst>
   </p:cSld>

</xml_diff>